<commit_message>
Deploying to gh-pages from @ DaveedDomingo/daveeddomingo.github.io@445a9848e539d63cae18aaae2f61eb0ffe9edb93 🚀
</commit_message>
<xml_diff>
--- a/assets/img/logo-sizing.pptx
+++ b/assets/img/logo-sizing.pptx
@@ -4,9 +4,13 @@
   <p:sldMasterIdLst>
     <p:sldMasterId id="2147483648" r:id="rId1"/>
   </p:sldMasterIdLst>
+  <p:notesMasterIdLst>
+    <p:notesMasterId r:id="rId5"/>
+  </p:notesMasterIdLst>
   <p:sldIdLst>
     <p:sldId id="256" r:id="rId2"/>
     <p:sldId id="257" r:id="rId3"/>
+    <p:sldId id="258" r:id="rId4"/>
   </p:sldIdLst>
   <p:sldSz cx="12192000" cy="6858000"/>
   <p:notesSz cx="6858000" cy="9144000"/>
@@ -105,7 +109,445 @@
       </a:defRPr>
     </a:lvl9pPr>
   </p:defaultTextStyle>
+  <p:extLst>
+    <p:ext uri="{EFAFB233-063F-42B5-8137-9DF3F51BA10A}">
+      <p15:sldGuideLst xmlns:p15="http://schemas.microsoft.com/office/powerpoint/2012/main"/>
+    </p:ext>
+  </p:extLst>
 </p:presentation>
+</file>
+
+<file path=ppt/notesMasters/notesMaster1.xml><?xml version="1.0" encoding="utf-8"?>
+<p:notesMaster xmlns:a="http://schemas.openxmlformats.org/drawingml/2006/main" xmlns:r="http://schemas.openxmlformats.org/officeDocument/2006/relationships" xmlns:p="http://schemas.openxmlformats.org/presentationml/2006/main">
+  <p:cSld>
+    <p:bg>
+      <p:bgRef idx="1001">
+        <a:schemeClr val="bg1"/>
+      </p:bgRef>
+    </p:bg>
+    <p:spTree>
+      <p:nvGrpSpPr>
+        <p:cNvPr id="1" name=""/>
+        <p:cNvGrpSpPr/>
+        <p:nvPr/>
+      </p:nvGrpSpPr>
+      <p:grpSpPr>
+        <a:xfrm>
+          <a:off x="0" y="0"/>
+          <a:ext cx="0" cy="0"/>
+          <a:chOff x="0" y="0"/>
+          <a:chExt cx="0" cy="0"/>
+        </a:xfrm>
+      </p:grpSpPr>
+      <p:sp>
+        <p:nvSpPr>
+          <p:cNvPr id="2" name="Header Placeholder 1"/>
+          <p:cNvSpPr>
+            <a:spLocks noGrp="1"/>
+          </p:cNvSpPr>
+          <p:nvPr>
+            <p:ph type="hdr" sz="quarter"/>
+          </p:nvPr>
+        </p:nvSpPr>
+        <p:spPr>
+          <a:xfrm>
+            <a:off x="0" y="0"/>
+            <a:ext cx="2971800" cy="458788"/>
+          </a:xfrm>
+          <a:prstGeom prst="rect">
+            <a:avLst/>
+          </a:prstGeom>
+        </p:spPr>
+        <p:txBody>
+          <a:bodyPr vert="horz" lIns="91440" tIns="45720" rIns="91440" bIns="45720" rtlCol="0"/>
+          <a:lstStyle>
+            <a:lvl1pPr algn="l">
+              <a:defRPr sz="1200"/>
+            </a:lvl1pPr>
+          </a:lstStyle>
+          <a:p>
+            <a:endParaRPr lang="en-US"/>
+          </a:p>
+        </p:txBody>
+      </p:sp>
+      <p:sp>
+        <p:nvSpPr>
+          <p:cNvPr id="3" name="Date Placeholder 2"/>
+          <p:cNvSpPr>
+            <a:spLocks noGrp="1"/>
+          </p:cNvSpPr>
+          <p:nvPr>
+            <p:ph type="dt" idx="1"/>
+          </p:nvPr>
+        </p:nvSpPr>
+        <p:spPr>
+          <a:xfrm>
+            <a:off x="3884613" y="0"/>
+            <a:ext cx="2971800" cy="458788"/>
+          </a:xfrm>
+          <a:prstGeom prst="rect">
+            <a:avLst/>
+          </a:prstGeom>
+        </p:spPr>
+        <p:txBody>
+          <a:bodyPr vert="horz" lIns="91440" tIns="45720" rIns="91440" bIns="45720" rtlCol="0"/>
+          <a:lstStyle>
+            <a:lvl1pPr algn="r">
+              <a:defRPr sz="1200"/>
+            </a:lvl1pPr>
+          </a:lstStyle>
+          <a:p>
+            <a:fld id="{C4817BB5-6D7A-6442-AEEE-C81E66EA8D0B}" type="datetimeFigureOut">
+              <a:rPr lang="en-US" smtClean="0"/>
+              <a:t>5/11/25</a:t>
+            </a:fld>
+            <a:endParaRPr lang="en-US"/>
+          </a:p>
+        </p:txBody>
+      </p:sp>
+      <p:sp>
+        <p:nvSpPr>
+          <p:cNvPr id="4" name="Slide Image Placeholder 3"/>
+          <p:cNvSpPr>
+            <a:spLocks noGrp="1" noRot="1" noChangeAspect="1"/>
+          </p:cNvSpPr>
+          <p:nvPr>
+            <p:ph type="sldImg" idx="2"/>
+          </p:nvPr>
+        </p:nvSpPr>
+        <p:spPr>
+          <a:xfrm>
+            <a:off x="685800" y="1143000"/>
+            <a:ext cx="5486400" cy="3086100"/>
+          </a:xfrm>
+          <a:prstGeom prst="rect">
+            <a:avLst/>
+          </a:prstGeom>
+          <a:noFill/>
+          <a:ln w="12700">
+            <a:solidFill>
+              <a:prstClr val="black"/>
+            </a:solidFill>
+          </a:ln>
+        </p:spPr>
+        <p:txBody>
+          <a:bodyPr vert="horz" lIns="91440" tIns="45720" rIns="91440" bIns="45720" rtlCol="0" anchor="ctr"/>
+          <a:lstStyle/>
+          <a:p>
+            <a:endParaRPr lang="en-US"/>
+          </a:p>
+        </p:txBody>
+      </p:sp>
+      <p:sp>
+        <p:nvSpPr>
+          <p:cNvPr id="5" name="Notes Placeholder 4"/>
+          <p:cNvSpPr>
+            <a:spLocks noGrp="1"/>
+          </p:cNvSpPr>
+          <p:nvPr>
+            <p:ph type="body" sz="quarter" idx="3"/>
+          </p:nvPr>
+        </p:nvSpPr>
+        <p:spPr>
+          <a:xfrm>
+            <a:off x="685800" y="4400550"/>
+            <a:ext cx="5486400" cy="3600450"/>
+          </a:xfrm>
+          <a:prstGeom prst="rect">
+            <a:avLst/>
+          </a:prstGeom>
+        </p:spPr>
+        <p:txBody>
+          <a:bodyPr vert="horz" lIns="91440" tIns="45720" rIns="91440" bIns="45720" rtlCol="0"/>
+          <a:lstStyle/>
+          <a:p>
+            <a:pPr lvl="0"/>
+            <a:r>
+              <a:rPr lang="en-US"/>
+              <a:t>Click to edit Master text styles</a:t>
+            </a:r>
+          </a:p>
+          <a:p>
+            <a:pPr lvl="1"/>
+            <a:r>
+              <a:rPr lang="en-US"/>
+              <a:t>Second level</a:t>
+            </a:r>
+          </a:p>
+          <a:p>
+            <a:pPr lvl="2"/>
+            <a:r>
+              <a:rPr lang="en-US"/>
+              <a:t>Third level</a:t>
+            </a:r>
+          </a:p>
+          <a:p>
+            <a:pPr lvl="3"/>
+            <a:r>
+              <a:rPr lang="en-US"/>
+              <a:t>Fourth level</a:t>
+            </a:r>
+          </a:p>
+          <a:p>
+            <a:pPr lvl="4"/>
+            <a:r>
+              <a:rPr lang="en-US"/>
+              <a:t>Fifth level</a:t>
+            </a:r>
+          </a:p>
+        </p:txBody>
+      </p:sp>
+      <p:sp>
+        <p:nvSpPr>
+          <p:cNvPr id="6" name="Footer Placeholder 5"/>
+          <p:cNvSpPr>
+            <a:spLocks noGrp="1"/>
+          </p:cNvSpPr>
+          <p:nvPr>
+            <p:ph type="ftr" sz="quarter" idx="4"/>
+          </p:nvPr>
+        </p:nvSpPr>
+        <p:spPr>
+          <a:xfrm>
+            <a:off x="0" y="8685213"/>
+            <a:ext cx="2971800" cy="458787"/>
+          </a:xfrm>
+          <a:prstGeom prst="rect">
+            <a:avLst/>
+          </a:prstGeom>
+        </p:spPr>
+        <p:txBody>
+          <a:bodyPr vert="horz" lIns="91440" tIns="45720" rIns="91440" bIns="45720" rtlCol="0" anchor="b"/>
+          <a:lstStyle>
+            <a:lvl1pPr algn="l">
+              <a:defRPr sz="1200"/>
+            </a:lvl1pPr>
+          </a:lstStyle>
+          <a:p>
+            <a:endParaRPr lang="en-US"/>
+          </a:p>
+        </p:txBody>
+      </p:sp>
+      <p:sp>
+        <p:nvSpPr>
+          <p:cNvPr id="7" name="Slide Number Placeholder 6"/>
+          <p:cNvSpPr>
+            <a:spLocks noGrp="1"/>
+          </p:cNvSpPr>
+          <p:nvPr>
+            <p:ph type="sldNum" sz="quarter" idx="5"/>
+          </p:nvPr>
+        </p:nvSpPr>
+        <p:spPr>
+          <a:xfrm>
+            <a:off x="3884613" y="8685213"/>
+            <a:ext cx="2971800" cy="458787"/>
+          </a:xfrm>
+          <a:prstGeom prst="rect">
+            <a:avLst/>
+          </a:prstGeom>
+        </p:spPr>
+        <p:txBody>
+          <a:bodyPr vert="horz" lIns="91440" tIns="45720" rIns="91440" bIns="45720" rtlCol="0" anchor="b"/>
+          <a:lstStyle>
+            <a:lvl1pPr algn="r">
+              <a:defRPr sz="1200"/>
+            </a:lvl1pPr>
+          </a:lstStyle>
+          <a:p>
+            <a:fld id="{94EAE24F-5C62-894A-8271-19E871F14ECE}" type="slidenum">
+              <a:rPr lang="en-US" smtClean="0"/>
+              <a:t>‹#›</a:t>
+            </a:fld>
+            <a:endParaRPr lang="en-US"/>
+          </a:p>
+        </p:txBody>
+      </p:sp>
+    </p:spTree>
+    <p:extLst>
+      <p:ext uri="{BB962C8B-B14F-4D97-AF65-F5344CB8AC3E}">
+        <p14:creationId xmlns:p14="http://schemas.microsoft.com/office/powerpoint/2010/main" val="1891373216"/>
+      </p:ext>
+    </p:extLst>
+  </p:cSld>
+  <p:clrMap bg1="lt1" tx1="dk1" bg2="lt2" tx2="dk2" accent1="accent1" accent2="accent2" accent3="accent3" accent4="accent4" accent5="accent5" accent6="accent6" hlink="hlink" folHlink="folHlink"/>
+  <p:notesStyle>
+    <a:lvl1pPr marL="0" algn="l" defTabSz="914400" rtl="0" eaLnBrk="1" latinLnBrk="0" hangingPunct="1">
+      <a:defRPr sz="1200" kern="1200">
+        <a:solidFill>
+          <a:schemeClr val="tx1"/>
+        </a:solidFill>
+        <a:latin typeface="+mn-lt"/>
+        <a:ea typeface="+mn-ea"/>
+        <a:cs typeface="+mn-cs"/>
+      </a:defRPr>
+    </a:lvl1pPr>
+    <a:lvl2pPr marL="457200" algn="l" defTabSz="914400" rtl="0" eaLnBrk="1" latinLnBrk="0" hangingPunct="1">
+      <a:defRPr sz="1200" kern="1200">
+        <a:solidFill>
+          <a:schemeClr val="tx1"/>
+        </a:solidFill>
+        <a:latin typeface="+mn-lt"/>
+        <a:ea typeface="+mn-ea"/>
+        <a:cs typeface="+mn-cs"/>
+      </a:defRPr>
+    </a:lvl2pPr>
+    <a:lvl3pPr marL="914400" algn="l" defTabSz="914400" rtl="0" eaLnBrk="1" latinLnBrk="0" hangingPunct="1">
+      <a:defRPr sz="1200" kern="1200">
+        <a:solidFill>
+          <a:schemeClr val="tx1"/>
+        </a:solidFill>
+        <a:latin typeface="+mn-lt"/>
+        <a:ea typeface="+mn-ea"/>
+        <a:cs typeface="+mn-cs"/>
+      </a:defRPr>
+    </a:lvl3pPr>
+    <a:lvl4pPr marL="1371600" algn="l" defTabSz="914400" rtl="0" eaLnBrk="1" latinLnBrk="0" hangingPunct="1">
+      <a:defRPr sz="1200" kern="1200">
+        <a:solidFill>
+          <a:schemeClr val="tx1"/>
+        </a:solidFill>
+        <a:latin typeface="+mn-lt"/>
+        <a:ea typeface="+mn-ea"/>
+        <a:cs typeface="+mn-cs"/>
+      </a:defRPr>
+    </a:lvl4pPr>
+    <a:lvl5pPr marL="1828800" algn="l" defTabSz="914400" rtl="0" eaLnBrk="1" latinLnBrk="0" hangingPunct="1">
+      <a:defRPr sz="1200" kern="1200">
+        <a:solidFill>
+          <a:schemeClr val="tx1"/>
+        </a:solidFill>
+        <a:latin typeface="+mn-lt"/>
+        <a:ea typeface="+mn-ea"/>
+        <a:cs typeface="+mn-cs"/>
+      </a:defRPr>
+    </a:lvl5pPr>
+    <a:lvl6pPr marL="2286000" algn="l" defTabSz="914400" rtl="0" eaLnBrk="1" latinLnBrk="0" hangingPunct="1">
+      <a:defRPr sz="1200" kern="1200">
+        <a:solidFill>
+          <a:schemeClr val="tx1"/>
+        </a:solidFill>
+        <a:latin typeface="+mn-lt"/>
+        <a:ea typeface="+mn-ea"/>
+        <a:cs typeface="+mn-cs"/>
+      </a:defRPr>
+    </a:lvl6pPr>
+    <a:lvl7pPr marL="2743200" algn="l" defTabSz="914400" rtl="0" eaLnBrk="1" latinLnBrk="0" hangingPunct="1">
+      <a:defRPr sz="1200" kern="1200">
+        <a:solidFill>
+          <a:schemeClr val="tx1"/>
+        </a:solidFill>
+        <a:latin typeface="+mn-lt"/>
+        <a:ea typeface="+mn-ea"/>
+        <a:cs typeface="+mn-cs"/>
+      </a:defRPr>
+    </a:lvl7pPr>
+    <a:lvl8pPr marL="3200400" algn="l" defTabSz="914400" rtl="0" eaLnBrk="1" latinLnBrk="0" hangingPunct="1">
+      <a:defRPr sz="1200" kern="1200">
+        <a:solidFill>
+          <a:schemeClr val="tx1"/>
+        </a:solidFill>
+        <a:latin typeface="+mn-lt"/>
+        <a:ea typeface="+mn-ea"/>
+        <a:cs typeface="+mn-cs"/>
+      </a:defRPr>
+    </a:lvl8pPr>
+    <a:lvl9pPr marL="3657600" algn="l" defTabSz="914400" rtl="0" eaLnBrk="1" latinLnBrk="0" hangingPunct="1">
+      <a:defRPr sz="1200" kern="1200">
+        <a:solidFill>
+          <a:schemeClr val="tx1"/>
+        </a:solidFill>
+        <a:latin typeface="+mn-lt"/>
+        <a:ea typeface="+mn-ea"/>
+        <a:cs typeface="+mn-cs"/>
+      </a:defRPr>
+    </a:lvl9pPr>
+  </p:notesStyle>
+</p:notesMaster>
+</file>
+
+<file path=ppt/notesSlides/notesSlide1.xml><?xml version="1.0" encoding="utf-8"?>
+<p:notes xmlns:a="http://schemas.openxmlformats.org/drawingml/2006/main" xmlns:r="http://schemas.openxmlformats.org/officeDocument/2006/relationships" xmlns:p="http://schemas.openxmlformats.org/presentationml/2006/main">
+  <p:cSld>
+    <p:spTree>
+      <p:nvGrpSpPr>
+        <p:cNvPr id="1" name=""/>
+        <p:cNvGrpSpPr/>
+        <p:nvPr/>
+      </p:nvGrpSpPr>
+      <p:grpSpPr>
+        <a:xfrm>
+          <a:off x="0" y="0"/>
+          <a:ext cx="0" cy="0"/>
+          <a:chOff x="0" y="0"/>
+          <a:chExt cx="0" cy="0"/>
+        </a:xfrm>
+      </p:grpSpPr>
+      <p:sp>
+        <p:nvSpPr>
+          <p:cNvPr id="2" name="Slide Image Placeholder 1"/>
+          <p:cNvSpPr>
+            <a:spLocks noGrp="1" noRot="1" noChangeAspect="1"/>
+          </p:cNvSpPr>
+          <p:nvPr>
+            <p:ph type="sldImg"/>
+          </p:nvPr>
+        </p:nvSpPr>
+        <p:spPr/>
+      </p:sp>
+      <p:sp>
+        <p:nvSpPr>
+          <p:cNvPr id="3" name="Notes Placeholder 2"/>
+          <p:cNvSpPr>
+            <a:spLocks noGrp="1"/>
+          </p:cNvSpPr>
+          <p:nvPr>
+            <p:ph type="body" idx="1"/>
+          </p:nvPr>
+        </p:nvSpPr>
+        <p:spPr/>
+        <p:txBody>
+          <a:bodyPr/>
+          <a:lstStyle/>
+          <a:p>
+            <a:endParaRPr lang="en-US" dirty="0"/>
+          </a:p>
+        </p:txBody>
+      </p:sp>
+      <p:sp>
+        <p:nvSpPr>
+          <p:cNvPr id="4" name="Slide Number Placeholder 3"/>
+          <p:cNvSpPr>
+            <a:spLocks noGrp="1"/>
+          </p:cNvSpPr>
+          <p:nvPr>
+            <p:ph type="sldNum" sz="quarter" idx="5"/>
+          </p:nvPr>
+        </p:nvSpPr>
+        <p:spPr/>
+        <p:txBody>
+          <a:bodyPr/>
+          <a:lstStyle/>
+          <a:p>
+            <a:fld id="{94EAE24F-5C62-894A-8271-19E871F14ECE}" type="slidenum">
+              <a:rPr lang="en-US" smtClean="0"/>
+              <a:t>3</a:t>
+            </a:fld>
+            <a:endParaRPr lang="en-US"/>
+          </a:p>
+        </p:txBody>
+      </p:sp>
+    </p:spTree>
+    <p:extLst>
+      <p:ext uri="{BB962C8B-B14F-4D97-AF65-F5344CB8AC3E}">
+        <p14:creationId xmlns:p14="http://schemas.microsoft.com/office/powerpoint/2010/main" val="3665535508"/>
+      </p:ext>
+    </p:extLst>
+  </p:cSld>
+  <p:clrMapOvr>
+    <a:masterClrMapping/>
+  </p:clrMapOvr>
+</p:notes>
 </file>
 
 <file path=ppt/slideLayouts/slideLayout1.xml><?xml version="1.0" encoding="utf-8"?>
@@ -255,7 +697,7 @@
           <a:p>
             <a:fld id="{AF07464B-2F3B-184A-A751-24C044DC562C}" type="datetimeFigureOut">
               <a:rPr lang="en-US" smtClean="0"/>
-              <a:t>4/24/25</a:t>
+              <a:t>5/11/25</a:t>
             </a:fld>
             <a:endParaRPr lang="en-US"/>
           </a:p>
@@ -453,7 +895,7 @@
           <a:p>
             <a:fld id="{AF07464B-2F3B-184A-A751-24C044DC562C}" type="datetimeFigureOut">
               <a:rPr lang="en-US" smtClean="0"/>
-              <a:t>4/24/25</a:t>
+              <a:t>5/11/25</a:t>
             </a:fld>
             <a:endParaRPr lang="en-US"/>
           </a:p>
@@ -661,7 +1103,7 @@
           <a:p>
             <a:fld id="{AF07464B-2F3B-184A-A751-24C044DC562C}" type="datetimeFigureOut">
               <a:rPr lang="en-US" smtClean="0"/>
-              <a:t>4/24/25</a:t>
+              <a:t>5/11/25</a:t>
             </a:fld>
             <a:endParaRPr lang="en-US"/>
           </a:p>
@@ -859,7 +1301,7 @@
           <a:p>
             <a:fld id="{AF07464B-2F3B-184A-A751-24C044DC562C}" type="datetimeFigureOut">
               <a:rPr lang="en-US" smtClean="0"/>
-              <a:t>4/24/25</a:t>
+              <a:t>5/11/25</a:t>
             </a:fld>
             <a:endParaRPr lang="en-US"/>
           </a:p>
@@ -1134,7 +1576,7 @@
           <a:p>
             <a:fld id="{AF07464B-2F3B-184A-A751-24C044DC562C}" type="datetimeFigureOut">
               <a:rPr lang="en-US" smtClean="0"/>
-              <a:t>4/24/25</a:t>
+              <a:t>5/11/25</a:t>
             </a:fld>
             <a:endParaRPr lang="en-US"/>
           </a:p>
@@ -1399,7 +1841,7 @@
           <a:p>
             <a:fld id="{AF07464B-2F3B-184A-A751-24C044DC562C}" type="datetimeFigureOut">
               <a:rPr lang="en-US" smtClean="0"/>
-              <a:t>4/24/25</a:t>
+              <a:t>5/11/25</a:t>
             </a:fld>
             <a:endParaRPr lang="en-US"/>
           </a:p>
@@ -1811,7 +2253,7 @@
           <a:p>
             <a:fld id="{AF07464B-2F3B-184A-A751-24C044DC562C}" type="datetimeFigureOut">
               <a:rPr lang="en-US" smtClean="0"/>
-              <a:t>4/24/25</a:t>
+              <a:t>5/11/25</a:t>
             </a:fld>
             <a:endParaRPr lang="en-US"/>
           </a:p>
@@ -1952,7 +2394,7 @@
           <a:p>
             <a:fld id="{AF07464B-2F3B-184A-A751-24C044DC562C}" type="datetimeFigureOut">
               <a:rPr lang="en-US" smtClean="0"/>
-              <a:t>4/24/25</a:t>
+              <a:t>5/11/25</a:t>
             </a:fld>
             <a:endParaRPr lang="en-US"/>
           </a:p>
@@ -2065,7 +2507,7 @@
           <a:p>
             <a:fld id="{AF07464B-2F3B-184A-A751-24C044DC562C}" type="datetimeFigureOut">
               <a:rPr lang="en-US" smtClean="0"/>
-              <a:t>4/24/25</a:t>
+              <a:t>5/11/25</a:t>
             </a:fld>
             <a:endParaRPr lang="en-US"/>
           </a:p>
@@ -2376,7 +2818,7 @@
           <a:p>
             <a:fld id="{AF07464B-2F3B-184A-A751-24C044DC562C}" type="datetimeFigureOut">
               <a:rPr lang="en-US" smtClean="0"/>
-              <a:t>4/24/25</a:t>
+              <a:t>5/11/25</a:t>
             </a:fld>
             <a:endParaRPr lang="en-US"/>
           </a:p>
@@ -2664,7 +3106,7 @@
           <a:p>
             <a:fld id="{AF07464B-2F3B-184A-A751-24C044DC562C}" type="datetimeFigureOut">
               <a:rPr lang="en-US" smtClean="0"/>
-              <a:t>4/24/25</a:t>
+              <a:t>5/11/25</a:t>
             </a:fld>
             <a:endParaRPr lang="en-US"/>
           </a:p>
@@ -2905,7 +3347,7 @@
           <a:p>
             <a:fld id="{AF07464B-2F3B-184A-A751-24C044DC562C}" type="datetimeFigureOut">
               <a:rPr lang="en-US" smtClean="0"/>
-              <a:t>4/24/25</a:t>
+              <a:t>5/11/25</a:t>
             </a:fld>
             <a:endParaRPr lang="en-US"/>
           </a:p>
@@ -3453,7 +3895,7 @@
         </p:blipFill>
         <p:spPr>
           <a:xfrm>
-            <a:off x="1991067" y="1522866"/>
+            <a:off x="8413409" y="842146"/>
             <a:ext cx="6146799" cy="5463721"/>
           </a:xfrm>
           <a:prstGeom prst="rect">
@@ -3463,10 +3905,10 @@
       </p:pic>
       <p:pic>
         <p:nvPicPr>
-          <p:cNvPr id="5" name="Picture 4" descr="A blue sign with white text and arrows&#10;&#10;AI-generated content may be incorrect.">
-            <a:extLst>
-              <a:ext uri="{FF2B5EF4-FFF2-40B4-BE49-F238E27FC236}">
-                <a16:creationId xmlns:a16="http://schemas.microsoft.com/office/drawing/2014/main" id="{F4A2F300-D089-04AA-8E74-3A79BA532204}"/>
+          <p:cNvPr id="3" name="Picture 2" descr="A blue sign with white arrows and words&#10;&#10;AI-generated content may be incorrect.">
+            <a:extLst>
+              <a:ext uri="{FF2B5EF4-FFF2-40B4-BE49-F238E27FC236}">
+                <a16:creationId xmlns:a16="http://schemas.microsoft.com/office/drawing/2014/main" id="{7474434E-AB0B-B9FE-63D9-8EC1E37E3E8E}"/>
               </a:ext>
             </a:extLst>
           </p:cNvPr>
@@ -3477,12 +3919,440 @@
         </p:nvPicPr>
         <p:blipFill>
           <a:blip r:embed="rId4"/>
+          <a:stretch>
+            <a:fillRect/>
+          </a:stretch>
+        </p:blipFill>
+        <p:spPr>
+          <a:xfrm>
+            <a:off x="705191" y="547008"/>
+            <a:ext cx="6167297" cy="5463720"/>
+          </a:xfrm>
+          <a:prstGeom prst="rect">
+            <a:avLst/>
+          </a:prstGeom>
+        </p:spPr>
+      </p:pic>
+    </p:spTree>
+    <p:extLst>
+      <p:ext uri="{BB962C8B-B14F-4D97-AF65-F5344CB8AC3E}">
+        <p14:creationId xmlns:p14="http://schemas.microsoft.com/office/powerpoint/2010/main" val="515767884"/>
+      </p:ext>
+    </p:extLst>
+  </p:cSld>
+  <p:clrMapOvr>
+    <a:masterClrMapping/>
+  </p:clrMapOvr>
+</p:sld>
+</file>
+
+<file path=ppt/slides/slide3.xml><?xml version="1.0" encoding="utf-8"?>
+<p:sld xmlns:a="http://schemas.openxmlformats.org/drawingml/2006/main" xmlns:r="http://schemas.openxmlformats.org/officeDocument/2006/relationships" xmlns:p="http://schemas.openxmlformats.org/presentationml/2006/main">
+  <p:cSld>
+    <p:spTree>
+      <p:nvGrpSpPr>
+        <p:cNvPr id="1" name="">
+          <a:extLst>
+            <a:ext uri="{FF2B5EF4-FFF2-40B4-BE49-F238E27FC236}">
+              <a16:creationId xmlns:a16="http://schemas.microsoft.com/office/drawing/2014/main" id="{2C707483-38E0-9BDA-4321-89C54948D409}"/>
+            </a:ext>
+          </a:extLst>
+        </p:cNvPr>
+        <p:cNvGrpSpPr/>
+        <p:nvPr/>
+      </p:nvGrpSpPr>
+      <p:grpSpPr>
+        <a:xfrm>
+          <a:off x="0" y="0"/>
+          <a:ext cx="0" cy="0"/>
+          <a:chOff x="0" y="0"/>
+          <a:chExt cx="0" cy="0"/>
+        </a:xfrm>
+      </p:grpSpPr>
+      <p:pic>
+        <p:nvPicPr>
+          <p:cNvPr id="5" name="Picture 4" descr="A blue sign with white text and arrows&#10;&#10;AI-generated content may be incorrect.">
+            <a:extLst>
+              <a:ext uri="{FF2B5EF4-FFF2-40B4-BE49-F238E27FC236}">
+                <a16:creationId xmlns:a16="http://schemas.microsoft.com/office/drawing/2014/main" id="{C99CAE62-0706-261A-C83B-F69DBC653ED9}"/>
+              </a:ext>
+            </a:extLst>
+          </p:cNvPr>
+          <p:cNvPicPr>
+            <a:picLocks noChangeAspect="1"/>
+          </p:cNvPicPr>
+          <p:nvPr/>
+        </p:nvPicPr>
+        <p:blipFill>
+          <a:blip r:embed="rId3"/>
           <a:srcRect t="2224"/>
           <a:stretch/>
         </p:blipFill>
         <p:spPr>
           <a:xfrm>
-            <a:off x="6305777" y="547008"/>
+            <a:off x="2005918" y="268061"/>
+            <a:ext cx="7112243" cy="6321877"/>
+          </a:xfrm>
+          <a:prstGeom prst="rect">
+            <a:avLst/>
+          </a:prstGeom>
+        </p:spPr>
+      </p:pic>
+      <p:sp>
+        <p:nvSpPr>
+          <p:cNvPr id="4" name="Rounded Rectangle 3">
+            <a:extLst>
+              <a:ext uri="{FF2B5EF4-FFF2-40B4-BE49-F238E27FC236}">
+                <a16:creationId xmlns:a16="http://schemas.microsoft.com/office/drawing/2014/main" id="{32EF07EF-B2D8-B7D4-FAA1-0D43FC75183F}"/>
+              </a:ext>
+            </a:extLst>
+          </p:cNvPr>
+          <p:cNvSpPr/>
+          <p:nvPr/>
+        </p:nvSpPr>
+        <p:spPr>
+          <a:xfrm>
+            <a:off x="3113315" y="2394857"/>
+            <a:ext cx="4909456" cy="304800"/>
+          </a:xfrm>
+          <a:prstGeom prst="roundRect">
+            <a:avLst/>
+          </a:prstGeom>
+          <a:solidFill>
+            <a:schemeClr val="bg1"/>
+          </a:solidFill>
+          <a:ln>
+            <a:solidFill>
+              <a:schemeClr val="bg1"/>
+            </a:solidFill>
+          </a:ln>
+        </p:spPr>
+        <p:style>
+          <a:lnRef idx="2">
+            <a:schemeClr val="accent1">
+              <a:shade val="15000"/>
+            </a:schemeClr>
+          </a:lnRef>
+          <a:fillRef idx="1">
+            <a:schemeClr val="accent1"/>
+          </a:fillRef>
+          <a:effectRef idx="0">
+            <a:schemeClr val="accent1"/>
+          </a:effectRef>
+          <a:fontRef idx="minor">
+            <a:schemeClr val="lt1"/>
+          </a:fontRef>
+        </p:style>
+        <p:txBody>
+          <a:bodyPr rtlCol="0" anchor="ctr"/>
+          <a:lstStyle/>
+          <a:p>
+            <a:pPr algn="ctr"/>
+            <a:endParaRPr lang="en-US">
+              <a:ln>
+                <a:solidFill>
+                  <a:schemeClr val="bg1"/>
+                </a:solidFill>
+              </a:ln>
+              <a:solidFill>
+                <a:schemeClr val="bg1"/>
+              </a:solidFill>
+            </a:endParaRPr>
+          </a:p>
+        </p:txBody>
+      </p:sp>
+      <p:sp>
+        <p:nvSpPr>
+          <p:cNvPr id="8" name="Oval 7">
+            <a:extLst>
+              <a:ext uri="{FF2B5EF4-FFF2-40B4-BE49-F238E27FC236}">
+                <a16:creationId xmlns:a16="http://schemas.microsoft.com/office/drawing/2014/main" id="{047FDFE9-15C7-AA13-EA90-4C6AE27AF04F}"/>
+              </a:ext>
+            </a:extLst>
+          </p:cNvPr>
+          <p:cNvSpPr/>
+          <p:nvPr/>
+        </p:nvSpPr>
+        <p:spPr>
+          <a:xfrm>
+            <a:off x="5181601" y="3491991"/>
+            <a:ext cx="527920" cy="519680"/>
+          </a:xfrm>
+          <a:prstGeom prst="ellipse">
+            <a:avLst/>
+          </a:prstGeom>
+          <a:solidFill>
+            <a:schemeClr val="bg1"/>
+          </a:solidFill>
+          <a:ln>
+            <a:solidFill>
+              <a:schemeClr val="bg1"/>
+            </a:solidFill>
+          </a:ln>
+        </p:spPr>
+        <p:style>
+          <a:lnRef idx="2">
+            <a:schemeClr val="accent1">
+              <a:shade val="15000"/>
+            </a:schemeClr>
+          </a:lnRef>
+          <a:fillRef idx="1">
+            <a:schemeClr val="accent1"/>
+          </a:fillRef>
+          <a:effectRef idx="0">
+            <a:schemeClr val="accent1"/>
+          </a:effectRef>
+          <a:fontRef idx="minor">
+            <a:schemeClr val="lt1"/>
+          </a:fontRef>
+        </p:style>
+        <p:txBody>
+          <a:bodyPr rtlCol="0" anchor="ctr"/>
+          <a:lstStyle/>
+          <a:p>
+            <a:pPr algn="ctr"/>
+            <a:endParaRPr lang="en-US"/>
+          </a:p>
+        </p:txBody>
+      </p:sp>
+      <p:sp>
+        <p:nvSpPr>
+          <p:cNvPr id="10" name="Oval 9">
+            <a:extLst>
+              <a:ext uri="{FF2B5EF4-FFF2-40B4-BE49-F238E27FC236}">
+                <a16:creationId xmlns:a16="http://schemas.microsoft.com/office/drawing/2014/main" id="{73C7CB02-F75D-8847-BEF9-9C08810795FC}"/>
+              </a:ext>
+            </a:extLst>
+          </p:cNvPr>
+          <p:cNvSpPr/>
+          <p:nvPr/>
+        </p:nvSpPr>
+        <p:spPr>
+          <a:xfrm>
+            <a:off x="3581401" y="3104641"/>
+            <a:ext cx="527920" cy="519680"/>
+          </a:xfrm>
+          <a:prstGeom prst="ellipse">
+            <a:avLst/>
+          </a:prstGeom>
+          <a:solidFill>
+            <a:schemeClr val="bg1"/>
+          </a:solidFill>
+          <a:ln>
+            <a:solidFill>
+              <a:schemeClr val="bg1"/>
+            </a:solidFill>
+          </a:ln>
+        </p:spPr>
+        <p:style>
+          <a:lnRef idx="2">
+            <a:schemeClr val="accent1">
+              <a:shade val="15000"/>
+            </a:schemeClr>
+          </a:lnRef>
+          <a:fillRef idx="1">
+            <a:schemeClr val="accent1"/>
+          </a:fillRef>
+          <a:effectRef idx="0">
+            <a:schemeClr val="accent1"/>
+          </a:effectRef>
+          <a:fontRef idx="minor">
+            <a:schemeClr val="lt1"/>
+          </a:fontRef>
+        </p:style>
+        <p:txBody>
+          <a:bodyPr rtlCol="0" anchor="ctr"/>
+          <a:lstStyle/>
+          <a:p>
+            <a:pPr algn="ctr"/>
+            <a:endParaRPr lang="en-US"/>
+          </a:p>
+        </p:txBody>
+      </p:sp>
+      <p:sp>
+        <p:nvSpPr>
+          <p:cNvPr id="11" name="Oval 10">
+            <a:extLst>
+              <a:ext uri="{FF2B5EF4-FFF2-40B4-BE49-F238E27FC236}">
+                <a16:creationId xmlns:a16="http://schemas.microsoft.com/office/drawing/2014/main" id="{57B076B6-DB37-CD37-B206-886BDF303A2E}"/>
+              </a:ext>
+            </a:extLst>
+          </p:cNvPr>
+          <p:cNvSpPr/>
+          <p:nvPr/>
+        </p:nvSpPr>
+        <p:spPr>
+          <a:xfrm>
+            <a:off x="3845361" y="4641341"/>
+            <a:ext cx="527920" cy="519680"/>
+          </a:xfrm>
+          <a:prstGeom prst="ellipse">
+            <a:avLst/>
+          </a:prstGeom>
+          <a:solidFill>
+            <a:schemeClr val="bg1"/>
+          </a:solidFill>
+          <a:ln>
+            <a:solidFill>
+              <a:schemeClr val="bg1"/>
+            </a:solidFill>
+          </a:ln>
+        </p:spPr>
+        <p:style>
+          <a:lnRef idx="2">
+            <a:schemeClr val="accent1">
+              <a:shade val="15000"/>
+            </a:schemeClr>
+          </a:lnRef>
+          <a:fillRef idx="1">
+            <a:schemeClr val="accent1"/>
+          </a:fillRef>
+          <a:effectRef idx="0">
+            <a:schemeClr val="accent1"/>
+          </a:effectRef>
+          <a:fontRef idx="minor">
+            <a:schemeClr val="lt1"/>
+          </a:fontRef>
+        </p:style>
+        <p:txBody>
+          <a:bodyPr rtlCol="0" anchor="ctr"/>
+          <a:lstStyle/>
+          <a:p>
+            <a:pPr algn="ctr"/>
+            <a:endParaRPr lang="en-US"/>
+          </a:p>
+        </p:txBody>
+      </p:sp>
+      <p:sp>
+        <p:nvSpPr>
+          <p:cNvPr id="12" name="Oval 11">
+            <a:extLst>
+              <a:ext uri="{FF2B5EF4-FFF2-40B4-BE49-F238E27FC236}">
+                <a16:creationId xmlns:a16="http://schemas.microsoft.com/office/drawing/2014/main" id="{A3759EDA-9B9B-B96C-43C7-8FA479E5D7DF}"/>
+              </a:ext>
+            </a:extLst>
+          </p:cNvPr>
+          <p:cNvSpPr/>
+          <p:nvPr/>
+        </p:nvSpPr>
+        <p:spPr>
+          <a:xfrm>
+            <a:off x="6747311" y="4438141"/>
+            <a:ext cx="527920" cy="519680"/>
+          </a:xfrm>
+          <a:prstGeom prst="ellipse">
+            <a:avLst/>
+          </a:prstGeom>
+          <a:solidFill>
+            <a:schemeClr val="bg1"/>
+          </a:solidFill>
+          <a:ln>
+            <a:solidFill>
+              <a:schemeClr val="bg1"/>
+            </a:solidFill>
+          </a:ln>
+        </p:spPr>
+        <p:style>
+          <a:lnRef idx="2">
+            <a:schemeClr val="accent1">
+              <a:shade val="15000"/>
+            </a:schemeClr>
+          </a:lnRef>
+          <a:fillRef idx="1">
+            <a:schemeClr val="accent1"/>
+          </a:fillRef>
+          <a:effectRef idx="0">
+            <a:schemeClr val="accent1"/>
+          </a:effectRef>
+          <a:fontRef idx="minor">
+            <a:schemeClr val="lt1"/>
+          </a:fontRef>
+        </p:style>
+        <p:txBody>
+          <a:bodyPr rtlCol="0" anchor="ctr"/>
+          <a:lstStyle/>
+          <a:p>
+            <a:pPr algn="ctr"/>
+            <a:endParaRPr lang="en-US"/>
+          </a:p>
+        </p:txBody>
+      </p:sp>
+      <p:sp>
+        <p:nvSpPr>
+          <p:cNvPr id="13" name="Oval 12">
+            <a:extLst>
+              <a:ext uri="{FF2B5EF4-FFF2-40B4-BE49-F238E27FC236}">
+                <a16:creationId xmlns:a16="http://schemas.microsoft.com/office/drawing/2014/main" id="{C391B522-EC93-6866-6F8B-6FA77B0DAF5B}"/>
+              </a:ext>
+            </a:extLst>
+          </p:cNvPr>
+          <p:cNvSpPr/>
+          <p:nvPr/>
+        </p:nvSpPr>
+        <p:spPr>
+          <a:xfrm>
+            <a:off x="6633011" y="2539888"/>
+            <a:ext cx="527920" cy="519680"/>
+          </a:xfrm>
+          <a:prstGeom prst="ellipse">
+            <a:avLst/>
+          </a:prstGeom>
+          <a:solidFill>
+            <a:schemeClr val="bg1"/>
+          </a:solidFill>
+          <a:ln>
+            <a:solidFill>
+              <a:schemeClr val="bg1"/>
+            </a:solidFill>
+          </a:ln>
+        </p:spPr>
+        <p:style>
+          <a:lnRef idx="2">
+            <a:schemeClr val="accent1">
+              <a:shade val="15000"/>
+            </a:schemeClr>
+          </a:lnRef>
+          <a:fillRef idx="1">
+            <a:schemeClr val="accent1"/>
+          </a:fillRef>
+          <a:effectRef idx="0">
+            <a:schemeClr val="accent1"/>
+          </a:effectRef>
+          <a:fontRef idx="minor">
+            <a:schemeClr val="lt1"/>
+          </a:fontRef>
+        </p:style>
+        <p:txBody>
+          <a:bodyPr rtlCol="0" anchor="ctr"/>
+          <a:lstStyle/>
+          <a:p>
+            <a:pPr algn="ctr"/>
+            <a:endParaRPr lang="en-US"/>
+          </a:p>
+        </p:txBody>
+      </p:sp>
+      <p:pic>
+        <p:nvPicPr>
+          <p:cNvPr id="14" name="Picture 13" descr="A blue sign with white text and arrows&#10;&#10;AI-generated content may be incorrect.">
+            <a:extLst>
+              <a:ext uri="{FF2B5EF4-FFF2-40B4-BE49-F238E27FC236}">
+                <a16:creationId xmlns:a16="http://schemas.microsoft.com/office/drawing/2014/main" id="{F1AAEDA1-6D98-D653-D796-F60F931B1191}"/>
+              </a:ext>
+            </a:extLst>
+          </p:cNvPr>
+          <p:cNvPicPr>
+            <a:picLocks noChangeAspect="1"/>
+          </p:cNvPicPr>
+          <p:nvPr/>
+        </p:nvPicPr>
+        <p:blipFill>
+          <a:blip r:embed="rId3"/>
+          <a:srcRect t="2224"/>
+          <a:stretch/>
+        </p:blipFill>
+        <p:spPr>
+          <a:xfrm>
+            <a:off x="10336614" y="557168"/>
             <a:ext cx="6146800" cy="5463721"/>
           </a:xfrm>
           <a:prstGeom prst="rect">
@@ -3493,7 +4363,7 @@
     </p:spTree>
     <p:extLst>
       <p:ext uri="{BB962C8B-B14F-4D97-AF65-F5344CB8AC3E}">
-        <p14:creationId xmlns:p14="http://schemas.microsoft.com/office/powerpoint/2010/main" val="515767884"/>
+        <p14:creationId xmlns:p14="http://schemas.microsoft.com/office/powerpoint/2010/main" val="3243502926"/>
       </p:ext>
     </p:extLst>
   </p:cSld>
@@ -3816,4 +4686,319 @@
     </a:ext>
   </a:extLst>
 </a:theme>
+</file>
+
+<file path=ppt/theme/theme2.xml><?xml version="1.0" encoding="utf-8"?>
+<a:theme xmlns:a="http://schemas.openxmlformats.org/drawingml/2006/main" name="Office Theme">
+  <a:themeElements>
+    <a:clrScheme name="Office">
+      <a:dk1>
+        <a:sysClr val="windowText" lastClr="000000"/>
+      </a:dk1>
+      <a:lt1>
+        <a:sysClr val="window" lastClr="FFFFFF"/>
+      </a:lt1>
+      <a:dk2>
+        <a:srgbClr val="0E2841"/>
+      </a:dk2>
+      <a:lt2>
+        <a:srgbClr val="E8E8E8"/>
+      </a:lt2>
+      <a:accent1>
+        <a:srgbClr val="156082"/>
+      </a:accent1>
+      <a:accent2>
+        <a:srgbClr val="E97132"/>
+      </a:accent2>
+      <a:accent3>
+        <a:srgbClr val="196B24"/>
+      </a:accent3>
+      <a:accent4>
+        <a:srgbClr val="0F9ED5"/>
+      </a:accent4>
+      <a:accent5>
+        <a:srgbClr val="A02B93"/>
+      </a:accent5>
+      <a:accent6>
+        <a:srgbClr val="4EA72E"/>
+      </a:accent6>
+      <a:hlink>
+        <a:srgbClr val="467886"/>
+      </a:hlink>
+      <a:folHlink>
+        <a:srgbClr val="96607D"/>
+      </a:folHlink>
+    </a:clrScheme>
+    <a:fontScheme name="Office">
+      <a:majorFont>
+        <a:latin typeface="Aptos Display" panose="02110004020202020204"/>
+        <a:ea typeface=""/>
+        <a:cs typeface=""/>
+        <a:font script="Jpan" typeface="游ゴシック Light"/>
+        <a:font script="Hang" typeface="맑은 고딕"/>
+        <a:font script="Hans" typeface="等线 Light"/>
+        <a:font script="Hant" typeface="新細明體"/>
+        <a:font script="Arab" typeface="Times New Roman"/>
+        <a:font script="Hebr" typeface="Times New Roman"/>
+        <a:font script="Thai" typeface="Angsana New"/>
+        <a:font script="Ethi" typeface="Nyala"/>
+        <a:font script="Beng" typeface="Vrinda"/>
+        <a:font script="Gujr" typeface="Shruti"/>
+        <a:font script="Khmr" typeface="MoolBoran"/>
+        <a:font script="Knda" typeface="Tunga"/>
+        <a:font script="Guru" typeface="Raavi"/>
+        <a:font script="Cans" typeface="Euphemia"/>
+        <a:font script="Cher" typeface="Plantagenet Cherokee"/>
+        <a:font script="Yiii" typeface="Microsoft Yi Baiti"/>
+        <a:font script="Tibt" typeface="Microsoft Himalaya"/>
+        <a:font script="Thaa" typeface="MV Boli"/>
+        <a:font script="Deva" typeface="Mangal"/>
+        <a:font script="Telu" typeface="Gautami"/>
+        <a:font script="Taml" typeface="Latha"/>
+        <a:font script="Syrc" typeface="Estrangelo Edessa"/>
+        <a:font script="Orya" typeface="Kalinga"/>
+        <a:font script="Mlym" typeface="Kartika"/>
+        <a:font script="Laoo" typeface="DokChampa"/>
+        <a:font script="Sinh" typeface="Iskoola Pota"/>
+        <a:font script="Mong" typeface="Mongolian Baiti"/>
+        <a:font script="Viet" typeface="Times New Roman"/>
+        <a:font script="Uigh" typeface="Microsoft Uighur"/>
+        <a:font script="Geor" typeface="Sylfaen"/>
+        <a:font script="Armn" typeface="Arial"/>
+        <a:font script="Bugi" typeface="Leelawadee UI"/>
+        <a:font script="Bopo" typeface="Microsoft JhengHei"/>
+        <a:font script="Java" typeface="Javanese Text"/>
+        <a:font script="Lisu" typeface="Segoe UI"/>
+        <a:font script="Mymr" typeface="Myanmar Text"/>
+        <a:font script="Nkoo" typeface="Ebrima"/>
+        <a:font script="Olck" typeface="Nirmala UI"/>
+        <a:font script="Osma" typeface="Ebrima"/>
+        <a:font script="Phag" typeface="Phagspa"/>
+        <a:font script="Syrn" typeface="Estrangelo Edessa"/>
+        <a:font script="Syrj" typeface="Estrangelo Edessa"/>
+        <a:font script="Syre" typeface="Estrangelo Edessa"/>
+        <a:font script="Sora" typeface="Nirmala UI"/>
+        <a:font script="Tale" typeface="Microsoft Tai Le"/>
+        <a:font script="Talu" typeface="Microsoft New Tai Lue"/>
+        <a:font script="Tfng" typeface="Ebrima"/>
+      </a:majorFont>
+      <a:minorFont>
+        <a:latin typeface="Aptos" panose="02110004020202020204"/>
+        <a:ea typeface=""/>
+        <a:cs typeface=""/>
+        <a:font script="Jpan" typeface="游ゴシック"/>
+        <a:font script="Hang" typeface="맑은 고딕"/>
+        <a:font script="Hans" typeface="等线"/>
+        <a:font script="Hant" typeface="新細明體"/>
+        <a:font script="Arab" typeface="Arial"/>
+        <a:font script="Hebr" typeface="Arial"/>
+        <a:font script="Thai" typeface="Cordia New"/>
+        <a:font script="Ethi" typeface="Nyala"/>
+        <a:font script="Beng" typeface="Vrinda"/>
+        <a:font script="Gujr" typeface="Shruti"/>
+        <a:font script="Khmr" typeface="DaunPenh"/>
+        <a:font script="Knda" typeface="Tunga"/>
+        <a:font script="Guru" typeface="Raavi"/>
+        <a:font script="Cans" typeface="Euphemia"/>
+        <a:font script="Cher" typeface="Plantagenet Cherokee"/>
+        <a:font script="Yiii" typeface="Microsoft Yi Baiti"/>
+        <a:font script="Tibt" typeface="Microsoft Himalaya"/>
+        <a:font script="Thaa" typeface="MV Boli"/>
+        <a:font script="Deva" typeface="Mangal"/>
+        <a:font script="Telu" typeface="Gautami"/>
+        <a:font script="Taml" typeface="Latha"/>
+        <a:font script="Syrc" typeface="Estrangelo Edessa"/>
+        <a:font script="Orya" typeface="Kalinga"/>
+        <a:font script="Mlym" typeface="Kartika"/>
+        <a:font script="Laoo" typeface="DokChampa"/>
+        <a:font script="Sinh" typeface="Iskoola Pota"/>
+        <a:font script="Mong" typeface="Mongolian Baiti"/>
+        <a:font script="Viet" typeface="Arial"/>
+        <a:font script="Uigh" typeface="Microsoft Uighur"/>
+        <a:font script="Geor" typeface="Sylfaen"/>
+        <a:font script="Armn" typeface="Arial"/>
+        <a:font script="Bugi" typeface="Leelawadee UI"/>
+        <a:font script="Bopo" typeface="Microsoft JhengHei"/>
+        <a:font script="Java" typeface="Javanese Text"/>
+        <a:font script="Lisu" typeface="Segoe UI"/>
+        <a:font script="Mymr" typeface="Myanmar Text"/>
+        <a:font script="Nkoo" typeface="Ebrima"/>
+        <a:font script="Olck" typeface="Nirmala UI"/>
+        <a:font script="Osma" typeface="Ebrima"/>
+        <a:font script="Phag" typeface="Phagspa"/>
+        <a:font script="Syrn" typeface="Estrangelo Edessa"/>
+        <a:font script="Syrj" typeface="Estrangelo Edessa"/>
+        <a:font script="Syre" typeface="Estrangelo Edessa"/>
+        <a:font script="Sora" typeface="Nirmala UI"/>
+        <a:font script="Tale" typeface="Microsoft Tai Le"/>
+        <a:font script="Talu" typeface="Microsoft New Tai Lue"/>
+        <a:font script="Tfng" typeface="Ebrima"/>
+      </a:minorFont>
+    </a:fontScheme>
+    <a:fmtScheme name="Office">
+      <a:fillStyleLst>
+        <a:solidFill>
+          <a:schemeClr val="phClr"/>
+        </a:solidFill>
+        <a:gradFill rotWithShape="1">
+          <a:gsLst>
+            <a:gs pos="0">
+              <a:schemeClr val="phClr">
+                <a:lumMod val="110000"/>
+                <a:satMod val="105000"/>
+                <a:tint val="67000"/>
+              </a:schemeClr>
+            </a:gs>
+            <a:gs pos="50000">
+              <a:schemeClr val="phClr">
+                <a:lumMod val="105000"/>
+                <a:satMod val="103000"/>
+                <a:tint val="73000"/>
+              </a:schemeClr>
+            </a:gs>
+            <a:gs pos="100000">
+              <a:schemeClr val="phClr">
+                <a:lumMod val="105000"/>
+                <a:satMod val="109000"/>
+                <a:tint val="81000"/>
+              </a:schemeClr>
+            </a:gs>
+          </a:gsLst>
+          <a:lin ang="5400000" scaled="0"/>
+        </a:gradFill>
+        <a:gradFill rotWithShape="1">
+          <a:gsLst>
+            <a:gs pos="0">
+              <a:schemeClr val="phClr">
+                <a:satMod val="103000"/>
+                <a:lumMod val="102000"/>
+                <a:tint val="94000"/>
+              </a:schemeClr>
+            </a:gs>
+            <a:gs pos="50000">
+              <a:schemeClr val="phClr">
+                <a:satMod val="110000"/>
+                <a:lumMod val="100000"/>
+                <a:shade val="100000"/>
+              </a:schemeClr>
+            </a:gs>
+            <a:gs pos="100000">
+              <a:schemeClr val="phClr">
+                <a:lumMod val="99000"/>
+                <a:satMod val="120000"/>
+                <a:shade val="78000"/>
+              </a:schemeClr>
+            </a:gs>
+          </a:gsLst>
+          <a:lin ang="5400000" scaled="0"/>
+        </a:gradFill>
+      </a:fillStyleLst>
+      <a:lnStyleLst>
+        <a:ln w="12700" cap="flat" cmpd="sng" algn="ctr">
+          <a:solidFill>
+            <a:schemeClr val="phClr"/>
+          </a:solidFill>
+          <a:prstDash val="solid"/>
+          <a:miter lim="800000"/>
+        </a:ln>
+        <a:ln w="19050" cap="flat" cmpd="sng" algn="ctr">
+          <a:solidFill>
+            <a:schemeClr val="phClr"/>
+          </a:solidFill>
+          <a:prstDash val="solid"/>
+          <a:miter lim="800000"/>
+        </a:ln>
+        <a:ln w="25400" cap="flat" cmpd="sng" algn="ctr">
+          <a:solidFill>
+            <a:schemeClr val="phClr"/>
+          </a:solidFill>
+          <a:prstDash val="solid"/>
+          <a:miter lim="800000"/>
+        </a:ln>
+      </a:lnStyleLst>
+      <a:effectStyleLst>
+        <a:effectStyle>
+          <a:effectLst/>
+        </a:effectStyle>
+        <a:effectStyle>
+          <a:effectLst/>
+        </a:effectStyle>
+        <a:effectStyle>
+          <a:effectLst>
+            <a:outerShdw blurRad="57150" dist="19050" dir="5400000" algn="ctr" rotWithShape="0">
+              <a:srgbClr val="000000">
+                <a:alpha val="63000"/>
+              </a:srgbClr>
+            </a:outerShdw>
+          </a:effectLst>
+        </a:effectStyle>
+      </a:effectStyleLst>
+      <a:bgFillStyleLst>
+        <a:solidFill>
+          <a:schemeClr val="phClr"/>
+        </a:solidFill>
+        <a:solidFill>
+          <a:schemeClr val="phClr">
+            <a:tint val="95000"/>
+            <a:satMod val="170000"/>
+          </a:schemeClr>
+        </a:solidFill>
+        <a:gradFill rotWithShape="1">
+          <a:gsLst>
+            <a:gs pos="0">
+              <a:schemeClr val="phClr">
+                <a:tint val="93000"/>
+                <a:satMod val="150000"/>
+                <a:shade val="98000"/>
+                <a:lumMod val="102000"/>
+              </a:schemeClr>
+            </a:gs>
+            <a:gs pos="50000">
+              <a:schemeClr val="phClr">
+                <a:tint val="98000"/>
+                <a:satMod val="130000"/>
+                <a:shade val="90000"/>
+                <a:lumMod val="103000"/>
+              </a:schemeClr>
+            </a:gs>
+            <a:gs pos="100000">
+              <a:schemeClr val="phClr">
+                <a:shade val="63000"/>
+                <a:satMod val="120000"/>
+              </a:schemeClr>
+            </a:gs>
+          </a:gsLst>
+          <a:lin ang="5400000" scaled="0"/>
+        </a:gradFill>
+      </a:bgFillStyleLst>
+    </a:fmtScheme>
+  </a:themeElements>
+  <a:objectDefaults>
+    <a:lnDef>
+      <a:spPr/>
+      <a:bodyPr/>
+      <a:lstStyle/>
+      <a:style>
+        <a:lnRef idx="2">
+          <a:schemeClr val="accent1"/>
+        </a:lnRef>
+        <a:fillRef idx="0">
+          <a:schemeClr val="accent1"/>
+        </a:fillRef>
+        <a:effectRef idx="1">
+          <a:schemeClr val="accent1"/>
+        </a:effectRef>
+        <a:fontRef idx="minor">
+          <a:schemeClr val="tx1"/>
+        </a:fontRef>
+      </a:style>
+    </a:lnDef>
+  </a:objectDefaults>
+  <a:extraClrSchemeLst/>
+  <a:extLst>
+    <a:ext uri="{05A4C25C-085E-4340-85A3-A5531E510DB2}">
+      <thm15:themeFamily xmlns:thm15="http://schemas.microsoft.com/office/thememl/2012/main" name="Office Theme" id="{2E142A2C-CD16-42D6-873A-C26D2A0506FA}" vid="{1BDDFF52-6CD6-40A5-AB3C-68EB2F1E4D0A}"/>
+    </a:ext>
+  </a:extLst>
+</a:theme>
 </file>
</xml_diff>

<commit_message>
add tools to projects
</commit_message>
<xml_diff>
--- a/assets/img/logo-sizing.pptx
+++ b/assets/img/logo-sizing.pptx
@@ -5,12 +5,16 @@
     <p:sldMasterId id="2147483648" r:id="rId1"/>
   </p:sldMasterIdLst>
   <p:notesMasterIdLst>
-    <p:notesMasterId r:id="rId5"/>
+    <p:notesMasterId r:id="rId9"/>
   </p:notesMasterIdLst>
   <p:sldIdLst>
     <p:sldId id="256" r:id="rId2"/>
     <p:sldId id="257" r:id="rId3"/>
     <p:sldId id="258" r:id="rId4"/>
+    <p:sldId id="261" r:id="rId5"/>
+    <p:sldId id="259" r:id="rId6"/>
+    <p:sldId id="260" r:id="rId7"/>
+    <p:sldId id="262" r:id="rId8"/>
   </p:sldIdLst>
   <p:sldSz cx="12192000" cy="6858000"/>
   <p:notesSz cx="6858000" cy="9144000"/>
@@ -467,6 +471,90 @@
 </file>
 
 <file path=ppt/notesSlides/notesSlide1.xml><?xml version="1.0" encoding="utf-8"?>
+<p:notes xmlns:a="http://schemas.openxmlformats.org/drawingml/2006/main" xmlns:r="http://schemas.openxmlformats.org/officeDocument/2006/relationships" xmlns:p="http://schemas.openxmlformats.org/presentationml/2006/main">
+  <p:cSld>
+    <p:spTree>
+      <p:nvGrpSpPr>
+        <p:cNvPr id="1" name=""/>
+        <p:cNvGrpSpPr/>
+        <p:nvPr/>
+      </p:nvGrpSpPr>
+      <p:grpSpPr>
+        <a:xfrm>
+          <a:off x="0" y="0"/>
+          <a:ext cx="0" cy="0"/>
+          <a:chOff x="0" y="0"/>
+          <a:chExt cx="0" cy="0"/>
+        </a:xfrm>
+      </p:grpSpPr>
+      <p:sp>
+        <p:nvSpPr>
+          <p:cNvPr id="2" name="Slide Image Placeholder 1"/>
+          <p:cNvSpPr>
+            <a:spLocks noGrp="1" noRot="1" noChangeAspect="1"/>
+          </p:cNvSpPr>
+          <p:nvPr>
+            <p:ph type="sldImg"/>
+          </p:nvPr>
+        </p:nvSpPr>
+        <p:spPr/>
+      </p:sp>
+      <p:sp>
+        <p:nvSpPr>
+          <p:cNvPr id="3" name="Notes Placeholder 2"/>
+          <p:cNvSpPr>
+            <a:spLocks noGrp="1"/>
+          </p:cNvSpPr>
+          <p:nvPr>
+            <p:ph type="body" idx="1"/>
+          </p:nvPr>
+        </p:nvSpPr>
+        <p:spPr/>
+        <p:txBody>
+          <a:bodyPr/>
+          <a:lstStyle/>
+          <a:p>
+            <a:endParaRPr lang="en-US" dirty="0"/>
+          </a:p>
+        </p:txBody>
+      </p:sp>
+      <p:sp>
+        <p:nvSpPr>
+          <p:cNvPr id="4" name="Slide Number Placeholder 3"/>
+          <p:cNvSpPr>
+            <a:spLocks noGrp="1"/>
+          </p:cNvSpPr>
+          <p:nvPr>
+            <p:ph type="sldNum" sz="quarter" idx="5"/>
+          </p:nvPr>
+        </p:nvSpPr>
+        <p:spPr/>
+        <p:txBody>
+          <a:bodyPr/>
+          <a:lstStyle/>
+          <a:p>
+            <a:fld id="{94EAE24F-5C62-894A-8271-19E871F14ECE}" type="slidenum">
+              <a:rPr lang="en-US" smtClean="0"/>
+              <a:t>2</a:t>
+            </a:fld>
+            <a:endParaRPr lang="en-US"/>
+          </a:p>
+        </p:txBody>
+      </p:sp>
+    </p:spTree>
+    <p:extLst>
+      <p:ext uri="{BB962C8B-B14F-4D97-AF65-F5344CB8AC3E}">
+        <p14:creationId xmlns:p14="http://schemas.microsoft.com/office/powerpoint/2010/main" val="1416978323"/>
+      </p:ext>
+    </p:extLst>
+  </p:cSld>
+  <p:clrMapOvr>
+    <a:masterClrMapping/>
+  </p:clrMapOvr>
+</p:notes>
+</file>
+
+<file path=ppt/notesSlides/notesSlide2.xml><?xml version="1.0" encoding="utf-8"?>
 <p:notes xmlns:a="http://schemas.openxmlformats.org/drawingml/2006/main" xmlns:r="http://schemas.openxmlformats.org/officeDocument/2006/relationships" xmlns:p="http://schemas.openxmlformats.org/presentationml/2006/main">
   <p:cSld>
     <p:spTree>
@@ -3859,14 +3947,14 @@
           <p:nvPr/>
         </p:nvPicPr>
         <p:blipFill>
-          <a:blip r:embed="rId2"/>
+          <a:blip r:embed="rId3"/>
           <a:stretch>
             <a:fillRect/>
           </a:stretch>
         </p:blipFill>
         <p:spPr>
           <a:xfrm>
-            <a:off x="705191" y="547008"/>
+            <a:off x="1050879" y="190169"/>
             <a:ext cx="6146686" cy="5463721"/>
           </a:xfrm>
           <a:prstGeom prst="rect">
@@ -3889,13 +3977,13 @@
           <p:nvPr/>
         </p:nvPicPr>
         <p:blipFill>
-          <a:blip r:embed="rId3"/>
+          <a:blip r:embed="rId4"/>
           <a:srcRect t="8899" b="2214"/>
           <a:stretch/>
         </p:blipFill>
         <p:spPr>
           <a:xfrm>
-            <a:off x="8413409" y="842146"/>
+            <a:off x="1050879" y="187448"/>
             <a:ext cx="6146799" cy="5463721"/>
           </a:xfrm>
           <a:prstGeom prst="rect">
@@ -3905,10 +3993,10 @@
       </p:pic>
       <p:pic>
         <p:nvPicPr>
-          <p:cNvPr id="3" name="Picture 2" descr="A blue sign with white arrows and words&#10;&#10;AI-generated content may be incorrect.">
-            <a:extLst>
-              <a:ext uri="{FF2B5EF4-FFF2-40B4-BE49-F238E27FC236}">
-                <a16:creationId xmlns:a16="http://schemas.microsoft.com/office/drawing/2014/main" id="{7474434E-AB0B-B9FE-63D9-8EC1E37E3E8E}"/>
+          <p:cNvPr id="8" name="Picture 7" descr="A black background with white text&#10;&#10;AI-generated content may be incorrect.">
+            <a:extLst>
+              <a:ext uri="{FF2B5EF4-FFF2-40B4-BE49-F238E27FC236}">
+                <a16:creationId xmlns:a16="http://schemas.microsoft.com/office/drawing/2014/main" id="{2EB7B12E-B4CD-9CE4-D17E-8DB6B27487DD}"/>
               </a:ext>
             </a:extLst>
           </p:cNvPr>
@@ -3918,15 +4006,104 @@
           <p:nvPr/>
         </p:nvPicPr>
         <p:blipFill>
-          <a:blip r:embed="rId4"/>
+          <a:blip r:embed="rId5"/>
+          <a:srcRect b="2057"/>
+          <a:stretch/>
+        </p:blipFill>
+        <p:spPr>
+          <a:xfrm>
+            <a:off x="9216130" y="685800"/>
+            <a:ext cx="6146685" cy="5463721"/>
+          </a:xfrm>
+          <a:prstGeom prst="rect">
+            <a:avLst/>
+          </a:prstGeom>
+        </p:spPr>
+      </p:pic>
+      <p:pic>
+        <p:nvPicPr>
+          <p:cNvPr id="12" name="Picture 11" descr="A blue background with white text&#10;&#10;AI-generated content may be incorrect.">
+            <a:extLst>
+              <a:ext uri="{FF2B5EF4-FFF2-40B4-BE49-F238E27FC236}">
+                <a16:creationId xmlns:a16="http://schemas.microsoft.com/office/drawing/2014/main" id="{9260412E-A075-2242-C24A-D4BCA6343DCB}"/>
+              </a:ext>
+            </a:extLst>
+          </p:cNvPr>
+          <p:cNvPicPr>
+            <a:picLocks noChangeAspect="1"/>
+          </p:cNvPicPr>
+          <p:nvPr/>
+        </p:nvPicPr>
+        <p:blipFill>
+          <a:blip r:embed="rId6"/>
           <a:stretch>
             <a:fillRect/>
           </a:stretch>
         </p:blipFill>
         <p:spPr>
           <a:xfrm>
-            <a:off x="705191" y="547008"/>
-            <a:ext cx="6167297" cy="5463720"/>
+            <a:off x="5133391" y="708479"/>
+            <a:ext cx="6146800" cy="5486400"/>
+          </a:xfrm>
+          <a:prstGeom prst="rect">
+            <a:avLst/>
+          </a:prstGeom>
+        </p:spPr>
+      </p:pic>
+      <p:pic>
+        <p:nvPicPr>
+          <p:cNvPr id="16" name="Picture 15" descr="A blue background with white arrows and text&#10;&#10;AI-generated content may be incorrect.">
+            <a:extLst>
+              <a:ext uri="{FF2B5EF4-FFF2-40B4-BE49-F238E27FC236}">
+                <a16:creationId xmlns:a16="http://schemas.microsoft.com/office/drawing/2014/main" id="{346E7F9B-469F-87EF-AF53-4B7153F1ACD6}"/>
+              </a:ext>
+            </a:extLst>
+          </p:cNvPr>
+          <p:cNvPicPr>
+            <a:picLocks noChangeAspect="1"/>
+          </p:cNvPicPr>
+          <p:nvPr/>
+        </p:nvPicPr>
+        <p:blipFill>
+          <a:blip r:embed="rId7"/>
+          <a:stretch>
+            <a:fillRect/>
+          </a:stretch>
+        </p:blipFill>
+        <p:spPr>
+          <a:xfrm>
+            <a:off x="1050879" y="190169"/>
+            <a:ext cx="6146800" cy="5461000"/>
+          </a:xfrm>
+          <a:prstGeom prst="rect">
+            <a:avLst/>
+          </a:prstGeom>
+        </p:spPr>
+      </p:pic>
+      <p:pic>
+        <p:nvPicPr>
+          <p:cNvPr id="18" name="Picture 17" descr="A green sign with white text and a magnifying glass&#10;&#10;AI-generated content may be incorrect.">
+            <a:extLst>
+              <a:ext uri="{FF2B5EF4-FFF2-40B4-BE49-F238E27FC236}">
+                <a16:creationId xmlns:a16="http://schemas.microsoft.com/office/drawing/2014/main" id="{1696390E-E9DC-DEA3-935E-CBA67F5047B3}"/>
+              </a:ext>
+            </a:extLst>
+          </p:cNvPr>
+          <p:cNvPicPr>
+            <a:picLocks noChangeAspect="1"/>
+          </p:cNvPicPr>
+          <p:nvPr/>
+        </p:nvPicPr>
+        <p:blipFill>
+          <a:blip r:embed="rId8"/>
+          <a:stretch>
+            <a:fillRect/>
+          </a:stretch>
+        </p:blipFill>
+        <p:spPr>
+          <a:xfrm>
+            <a:off x="753962" y="187448"/>
+            <a:ext cx="6146800" cy="5486400"/>
           </a:xfrm>
           <a:prstGeom prst="rect">
             <a:avLst/>
@@ -4364,6 +4541,1117 @@
     <p:extLst>
       <p:ext uri="{BB962C8B-B14F-4D97-AF65-F5344CB8AC3E}">
         <p14:creationId xmlns:p14="http://schemas.microsoft.com/office/powerpoint/2010/main" val="3243502926"/>
+      </p:ext>
+    </p:extLst>
+  </p:cSld>
+  <p:clrMapOvr>
+    <a:masterClrMapping/>
+  </p:clrMapOvr>
+</p:sld>
+</file>
+
+<file path=ppt/slides/slide4.xml><?xml version="1.0" encoding="utf-8"?>
+<p:sld xmlns:a="http://schemas.openxmlformats.org/drawingml/2006/main" xmlns:r="http://schemas.openxmlformats.org/officeDocument/2006/relationships" xmlns:p="http://schemas.openxmlformats.org/presentationml/2006/main">
+  <p:cSld>
+    <p:spTree>
+      <p:nvGrpSpPr>
+        <p:cNvPr id="1" name=""/>
+        <p:cNvGrpSpPr/>
+        <p:nvPr/>
+      </p:nvGrpSpPr>
+      <p:grpSpPr>
+        <a:xfrm>
+          <a:off x="0" y="0"/>
+          <a:ext cx="0" cy="0"/>
+          <a:chOff x="0" y="0"/>
+          <a:chExt cx="0" cy="0"/>
+        </a:xfrm>
+      </p:grpSpPr>
+      <p:pic>
+        <p:nvPicPr>
+          <p:cNvPr id="4" name="Picture 3" descr="A blue sign with white arrows and words&#10;&#10;AI-generated content may be incorrect.">
+            <a:extLst>
+              <a:ext uri="{FF2B5EF4-FFF2-40B4-BE49-F238E27FC236}">
+                <a16:creationId xmlns:a16="http://schemas.microsoft.com/office/drawing/2014/main" id="{B222EF90-2424-0956-3AF9-DEF1F832BFDA}"/>
+              </a:ext>
+            </a:extLst>
+          </p:cNvPr>
+          <p:cNvPicPr>
+            <a:picLocks noChangeAspect="1"/>
+          </p:cNvPicPr>
+          <p:nvPr/>
+        </p:nvPicPr>
+        <p:blipFill>
+          <a:blip r:embed="rId2"/>
+          <a:srcRect l="332" t="-1" r="550" b="550"/>
+          <a:stretch/>
+        </p:blipFill>
+        <p:spPr>
+          <a:xfrm>
+            <a:off x="1875956" y="513553"/>
+            <a:ext cx="6146686" cy="5463721"/>
+          </a:xfrm>
+          <a:prstGeom prst="rect">
+            <a:avLst/>
+          </a:prstGeom>
+        </p:spPr>
+      </p:pic>
+      <p:pic>
+        <p:nvPicPr>
+          <p:cNvPr id="5" name="Picture 4" descr="A blue sign with white arrows and words&#10;&#10;AI-generated content may be incorrect.">
+            <a:extLst>
+              <a:ext uri="{FF2B5EF4-FFF2-40B4-BE49-F238E27FC236}">
+                <a16:creationId xmlns:a16="http://schemas.microsoft.com/office/drawing/2014/main" id="{673DDDF4-15DD-03CE-4F8C-D128C7E0927D}"/>
+              </a:ext>
+            </a:extLst>
+          </p:cNvPr>
+          <p:cNvPicPr>
+            <a:picLocks noChangeAspect="1"/>
+          </p:cNvPicPr>
+          <p:nvPr/>
+        </p:nvPicPr>
+        <p:blipFill>
+          <a:blip r:embed="rId2"/>
+          <a:srcRect l="332" t="-1" r="550" b="550"/>
+          <a:stretch/>
+        </p:blipFill>
+        <p:spPr>
+          <a:xfrm>
+            <a:off x="3916629" y="880726"/>
+            <a:ext cx="6146686" cy="5463721"/>
+          </a:xfrm>
+          <a:prstGeom prst="rect">
+            <a:avLst/>
+          </a:prstGeom>
+        </p:spPr>
+      </p:pic>
+      <p:pic>
+        <p:nvPicPr>
+          <p:cNvPr id="6" name="Picture 5" descr="A blue sign with white arrows and words&#10;&#10;AI-generated content may be incorrect.">
+            <a:extLst>
+              <a:ext uri="{FF2B5EF4-FFF2-40B4-BE49-F238E27FC236}">
+                <a16:creationId xmlns:a16="http://schemas.microsoft.com/office/drawing/2014/main" id="{3D553D86-3F6F-D42F-9DC1-951D04A42393}"/>
+              </a:ext>
+            </a:extLst>
+          </p:cNvPr>
+          <p:cNvPicPr>
+            <a:picLocks noChangeAspect="1"/>
+          </p:cNvPicPr>
+          <p:nvPr/>
+        </p:nvPicPr>
+        <p:blipFill>
+          <a:blip r:embed="rId2"/>
+          <a:srcRect l="1429" t="-1" r="550" b="550"/>
+          <a:stretch/>
+        </p:blipFill>
+        <p:spPr>
+          <a:xfrm>
+            <a:off x="4365496" y="1094127"/>
+            <a:ext cx="5427713" cy="4878612"/>
+          </a:xfrm>
+          <a:prstGeom prst="rect">
+            <a:avLst/>
+          </a:prstGeom>
+        </p:spPr>
+      </p:pic>
+    </p:spTree>
+    <p:extLst>
+      <p:ext uri="{BB962C8B-B14F-4D97-AF65-F5344CB8AC3E}">
+        <p14:creationId xmlns:p14="http://schemas.microsoft.com/office/powerpoint/2010/main" val="4272608065"/>
+      </p:ext>
+    </p:extLst>
+  </p:cSld>
+  <p:clrMapOvr>
+    <a:masterClrMapping/>
+  </p:clrMapOvr>
+</p:sld>
+</file>
+
+<file path=ppt/slides/slide5.xml><?xml version="1.0" encoding="utf-8"?>
+<p:sld xmlns:a="http://schemas.openxmlformats.org/drawingml/2006/main" xmlns:r="http://schemas.openxmlformats.org/officeDocument/2006/relationships" xmlns:p="http://schemas.openxmlformats.org/presentationml/2006/main">
+  <p:cSld>
+    <p:spTree>
+      <p:nvGrpSpPr>
+        <p:cNvPr id="1" name=""/>
+        <p:cNvGrpSpPr/>
+        <p:nvPr/>
+      </p:nvGrpSpPr>
+      <p:grpSpPr>
+        <a:xfrm>
+          <a:off x="0" y="0"/>
+          <a:ext cx="0" cy="0"/>
+          <a:chOff x="0" y="0"/>
+          <a:chExt cx="0" cy="0"/>
+        </a:xfrm>
+      </p:grpSpPr>
+      <p:sp>
+        <p:nvSpPr>
+          <p:cNvPr id="4" name="Rectangle 3">
+            <a:extLst>
+              <a:ext uri="{FF2B5EF4-FFF2-40B4-BE49-F238E27FC236}">
+                <a16:creationId xmlns:a16="http://schemas.microsoft.com/office/drawing/2014/main" id="{F06D2323-545B-6D2B-7B7A-5FA6986B2899}"/>
+              </a:ext>
+            </a:extLst>
+          </p:cNvPr>
+          <p:cNvSpPr/>
+          <p:nvPr/>
+        </p:nvSpPr>
+        <p:spPr>
+          <a:xfrm>
+            <a:off x="5699978" y="547007"/>
+            <a:ext cx="6029905" cy="5463721"/>
+          </a:xfrm>
+          <a:prstGeom prst="rect">
+            <a:avLst/>
+          </a:prstGeom>
+          <a:solidFill>
+            <a:schemeClr val="tx1"/>
+          </a:solidFill>
+          <a:ln>
+            <a:solidFill>
+              <a:schemeClr val="tx1"/>
+            </a:solidFill>
+          </a:ln>
+        </p:spPr>
+        <p:style>
+          <a:lnRef idx="2">
+            <a:schemeClr val="accent1">
+              <a:shade val="15000"/>
+            </a:schemeClr>
+          </a:lnRef>
+          <a:fillRef idx="1">
+            <a:schemeClr val="accent1"/>
+          </a:fillRef>
+          <a:effectRef idx="0">
+            <a:schemeClr val="accent1"/>
+          </a:effectRef>
+          <a:fontRef idx="minor">
+            <a:schemeClr val="lt1"/>
+          </a:fontRef>
+        </p:style>
+        <p:txBody>
+          <a:bodyPr rtlCol="0" anchor="ctr"/>
+          <a:lstStyle/>
+          <a:p>
+            <a:pPr algn="ctr"/>
+            <a:r>
+              <a:rPr lang="en-US" sz="4800" b="1" dirty="0">
+                <a:latin typeface="Andale Mono" panose="020B0509000000000004" pitchFamily="49" charset="0"/>
+              </a:rPr>
+              <a:t>$CommandQueue</a:t>
+            </a:r>
+          </a:p>
+          <a:p>
+            <a:pPr algn="ctr"/>
+            <a:endParaRPr lang="en-US" sz="4800" b="1" dirty="0">
+              <a:latin typeface="Andale Mono" panose="020B0509000000000004" pitchFamily="49" charset="0"/>
+            </a:endParaRPr>
+          </a:p>
+          <a:p>
+            <a:pPr algn="ctr"/>
+            <a:endParaRPr lang="en-US" sz="4800" b="1" dirty="0">
+              <a:latin typeface="Andale Mono" panose="020B0509000000000004" pitchFamily="49" charset="0"/>
+            </a:endParaRPr>
+          </a:p>
+          <a:p>
+            <a:pPr algn="ctr"/>
+            <a:r>
+              <a:rPr lang="en-US" sz="3200" b="1" dirty="0">
+                <a:latin typeface="Andale Mono" panose="020B0509000000000004" pitchFamily="49" charset="0"/>
+              </a:rPr>
+              <a:t> </a:t>
+            </a:r>
+          </a:p>
+        </p:txBody>
+      </p:sp>
+      <p:sp>
+        <p:nvSpPr>
+          <p:cNvPr id="5" name="TextBox 4">
+            <a:extLst>
+              <a:ext uri="{FF2B5EF4-FFF2-40B4-BE49-F238E27FC236}">
+                <a16:creationId xmlns:a16="http://schemas.microsoft.com/office/drawing/2014/main" id="{5733F0AD-E08B-1747-A97D-2FA745059384}"/>
+              </a:ext>
+            </a:extLst>
+          </p:cNvPr>
+          <p:cNvSpPr txBox="1"/>
+          <p:nvPr/>
+        </p:nvSpPr>
+        <p:spPr>
+          <a:xfrm>
+            <a:off x="6517456" y="2397282"/>
+            <a:ext cx="4216527" cy="3139321"/>
+          </a:xfrm>
+          <a:prstGeom prst="rect">
+            <a:avLst/>
+          </a:prstGeom>
+          <a:noFill/>
+        </p:spPr>
+        <p:txBody>
+          <a:bodyPr wrap="square" rtlCol="0">
+            <a:spAutoFit/>
+          </a:bodyPr>
+          <a:lstStyle/>
+          <a:p>
+            <a:r>
+              <a:rPr kumimoji="0" lang="en-US" sz="4800" b="1" i="0" u="none" strike="noStrike" kern="1200" cap="none" spc="0" normalizeH="0" baseline="0" noProof="0" dirty="0">
+                <a:ln>
+                  <a:noFill/>
+                </a:ln>
+                <a:solidFill>
+                  <a:prstClr val="white"/>
+                </a:solidFill>
+                <a:effectLst/>
+                <a:uLnTx/>
+                <a:uFillTx/>
+                <a:latin typeface="Andale Mono" panose="020B0509000000000004" pitchFamily="49" charset="0"/>
+                <a:ea typeface="+mn-ea"/>
+                <a:cs typeface="+mn-cs"/>
+              </a:rPr>
+              <a:t>.......</a:t>
+            </a:r>
+            <a:br>
+              <a:rPr kumimoji="0" lang="en-US" sz="4800" b="1" i="0" u="none" strike="noStrike" kern="1200" cap="none" spc="0" normalizeH="0" baseline="0" noProof="0" dirty="0">
+                <a:ln>
+                  <a:noFill/>
+                </a:ln>
+                <a:solidFill>
+                  <a:prstClr val="white"/>
+                </a:solidFill>
+                <a:effectLst/>
+                <a:uLnTx/>
+                <a:uFillTx/>
+                <a:latin typeface="Andale Mono" panose="020B0509000000000004" pitchFamily="49" charset="0"/>
+                <a:ea typeface="+mn-ea"/>
+                <a:cs typeface="+mn-cs"/>
+              </a:rPr>
+            </a:br>
+            <a:r>
+              <a:rPr lang="en-US" sz="4800" b="1" dirty="0">
+                <a:solidFill>
+                  <a:prstClr val="white"/>
+                </a:solidFill>
+                <a:latin typeface="Andale Mono" panose="020B0509000000000004" pitchFamily="49" charset="0"/>
+              </a:rPr>
+              <a:t>....</a:t>
+            </a:r>
+          </a:p>
+          <a:p>
+            <a:r>
+              <a:rPr lang="en-US" sz="4800" b="1" dirty="0">
+                <a:solidFill>
+                  <a:prstClr val="white"/>
+                </a:solidFill>
+                <a:latin typeface="Andale Mono" panose="020B0509000000000004" pitchFamily="49" charset="0"/>
+              </a:rPr>
+              <a:t>.</a:t>
+            </a:r>
+          </a:p>
+          <a:p>
+            <a:r>
+              <a:rPr lang="en-US" sz="4800" b="1" dirty="0">
+                <a:solidFill>
+                  <a:prstClr val="white"/>
+                </a:solidFill>
+                <a:latin typeface="Andale Mono" panose="020B0509000000000004" pitchFamily="49" charset="0"/>
+              </a:rPr>
+              <a:t> </a:t>
+            </a:r>
+            <a:endParaRPr lang="en-US" sz="5400" b="1" dirty="0">
+              <a:solidFill>
+                <a:schemeClr val="bg1"/>
+              </a:solidFill>
+            </a:endParaRPr>
+          </a:p>
+        </p:txBody>
+      </p:sp>
+    </p:spTree>
+    <p:extLst>
+      <p:ext uri="{BB962C8B-B14F-4D97-AF65-F5344CB8AC3E}">
+        <p14:creationId xmlns:p14="http://schemas.microsoft.com/office/powerpoint/2010/main" val="4189953785"/>
+      </p:ext>
+    </p:extLst>
+  </p:cSld>
+  <p:clrMapOvr>
+    <a:masterClrMapping/>
+  </p:clrMapOvr>
+</p:sld>
+</file>
+
+<file path=ppt/slides/slide6.xml><?xml version="1.0" encoding="utf-8"?>
+<p:sld xmlns:a="http://schemas.openxmlformats.org/drawingml/2006/main" xmlns:r="http://schemas.openxmlformats.org/officeDocument/2006/relationships" xmlns:p="http://schemas.openxmlformats.org/presentationml/2006/main">
+  <p:cSld>
+    <p:spTree>
+      <p:nvGrpSpPr>
+        <p:cNvPr id="1" name=""/>
+        <p:cNvGrpSpPr/>
+        <p:nvPr/>
+      </p:nvGrpSpPr>
+      <p:grpSpPr>
+        <a:xfrm>
+          <a:off x="0" y="0"/>
+          <a:ext cx="0" cy="0"/>
+          <a:chOff x="0" y="0"/>
+          <a:chExt cx="0" cy="0"/>
+        </a:xfrm>
+      </p:grpSpPr>
+      <p:sp>
+        <p:nvSpPr>
+          <p:cNvPr id="5" name="Rectangle 4">
+            <a:extLst>
+              <a:ext uri="{FF2B5EF4-FFF2-40B4-BE49-F238E27FC236}">
+                <a16:creationId xmlns:a16="http://schemas.microsoft.com/office/drawing/2014/main" id="{FB4D3684-BEF6-6A35-2E23-B14762DB7BBD}"/>
+              </a:ext>
+            </a:extLst>
+          </p:cNvPr>
+          <p:cNvSpPr/>
+          <p:nvPr/>
+        </p:nvSpPr>
+        <p:spPr>
+          <a:xfrm>
+            <a:off x="1472637" y="697138"/>
+            <a:ext cx="6146685" cy="5463721"/>
+          </a:xfrm>
+          <a:prstGeom prst="rect">
+            <a:avLst/>
+          </a:prstGeom>
+          <a:ln>
+            <a:noFill/>
+          </a:ln>
+        </p:spPr>
+        <p:style>
+          <a:lnRef idx="2">
+            <a:schemeClr val="accent1">
+              <a:shade val="15000"/>
+            </a:schemeClr>
+          </a:lnRef>
+          <a:fillRef idx="1">
+            <a:schemeClr val="accent1"/>
+          </a:fillRef>
+          <a:effectRef idx="0">
+            <a:schemeClr val="accent1"/>
+          </a:effectRef>
+          <a:fontRef idx="minor">
+            <a:schemeClr val="lt1"/>
+          </a:fontRef>
+        </p:style>
+        <p:txBody>
+          <a:bodyPr rtlCol="0" anchor="ctr"/>
+          <a:lstStyle/>
+          <a:p>
+            <a:pPr algn="ctr"/>
+            <a:r>
+              <a:rPr lang="en-US" sz="5400" b="1" dirty="0"/>
+              <a:t>/</a:t>
+            </a:r>
+            <a:r>
+              <a:rPr lang="en-US" sz="5400" b="1" dirty="0" err="1"/>
+              <a:t>usr</a:t>
+            </a:r>
+            <a:r>
+              <a:rPr lang="en-US" sz="5400" b="1" dirty="0"/>
+              <a:t>/thread/time</a:t>
+            </a:r>
+          </a:p>
+          <a:p>
+            <a:pPr algn="ctr"/>
+            <a:endParaRPr lang="en-US" sz="5400" b="1" dirty="0"/>
+          </a:p>
+          <a:p>
+            <a:pPr algn="ctr"/>
+            <a:endParaRPr lang="en-US" sz="5400" b="1" dirty="0"/>
+          </a:p>
+          <a:p>
+            <a:pPr algn="ctr"/>
+            <a:endParaRPr lang="en-US" b="1" dirty="0"/>
+          </a:p>
+        </p:txBody>
+      </p:sp>
+      <p:sp>
+        <p:nvSpPr>
+          <p:cNvPr id="6" name="TextBox 5">
+            <a:extLst>
+              <a:ext uri="{FF2B5EF4-FFF2-40B4-BE49-F238E27FC236}">
+                <a16:creationId xmlns:a16="http://schemas.microsoft.com/office/drawing/2014/main" id="{F8D00DFB-DA65-841E-1263-2B5A3ACE5625}"/>
+              </a:ext>
+            </a:extLst>
+          </p:cNvPr>
+          <p:cNvSpPr txBox="1"/>
+          <p:nvPr/>
+        </p:nvSpPr>
+        <p:spPr>
+          <a:xfrm>
+            <a:off x="3453160" y="2921622"/>
+            <a:ext cx="2564780" cy="2123658"/>
+          </a:xfrm>
+          <a:prstGeom prst="rect">
+            <a:avLst/>
+          </a:prstGeom>
+          <a:noFill/>
+        </p:spPr>
+        <p:txBody>
+          <a:bodyPr wrap="square" rtlCol="0">
+            <a:spAutoFit/>
+          </a:bodyPr>
+          <a:lstStyle/>
+          <a:p>
+            <a:r>
+              <a:rPr lang="en-US" b="1" dirty="0">
+                <a:solidFill>
+                  <a:schemeClr val="bg1"/>
+                </a:solidFill>
+              </a:rPr>
+              <a:t>thread 0:</a:t>
+            </a:r>
+          </a:p>
+          <a:p>
+            <a:pPr lvl="1"/>
+            <a:r>
+              <a:rPr lang="en-US" sz="1200" b="1" dirty="0">
+                <a:solidFill>
+                  <a:schemeClr val="bg1"/>
+                </a:solidFill>
+              </a:rPr>
+              <a:t>memory = . . . </a:t>
+            </a:r>
+          </a:p>
+          <a:p>
+            <a:pPr lvl="1"/>
+            <a:r>
+              <a:rPr lang="en-US" sz="1200" b="1" dirty="0">
+                <a:solidFill>
+                  <a:schemeClr val="bg1"/>
+                </a:solidFill>
+              </a:rPr>
+              <a:t>page faults = . . .</a:t>
+            </a:r>
+          </a:p>
+          <a:p>
+            <a:pPr lvl="1"/>
+            <a:r>
+              <a:rPr lang="en-US" sz="1200" b="1" dirty="0">
+                <a:solidFill>
+                  <a:schemeClr val="bg1"/>
+                </a:solidFill>
+              </a:rPr>
+              <a:t>context switches = . . . </a:t>
+            </a:r>
+          </a:p>
+          <a:p>
+            <a:pPr lvl="1"/>
+            <a:r>
+              <a:rPr lang="en-US" sz="1200" b="1" dirty="0">
+                <a:solidFill>
+                  <a:schemeClr val="bg1"/>
+                </a:solidFill>
+              </a:rPr>
+              <a:t>blocks = . . . </a:t>
+            </a:r>
+            <a:endParaRPr lang="en-US" sz="1600" b="1" dirty="0">
+              <a:solidFill>
+                <a:schemeClr val="bg1"/>
+              </a:solidFill>
+            </a:endParaRPr>
+          </a:p>
+          <a:p>
+            <a:r>
+              <a:rPr lang="en-US" b="1" dirty="0">
+                <a:solidFill>
+                  <a:schemeClr val="bg1"/>
+                </a:solidFill>
+              </a:rPr>
+              <a:t>thread n:</a:t>
+            </a:r>
+          </a:p>
+          <a:p>
+            <a:pPr lvl="1"/>
+            <a:r>
+              <a:rPr lang="en-US" sz="1200" b="1" dirty="0">
+                <a:solidFill>
+                  <a:schemeClr val="bg1"/>
+                </a:solidFill>
+              </a:rPr>
+              <a:t>memory = . . . </a:t>
+            </a:r>
+          </a:p>
+          <a:p>
+            <a:pPr lvl="1"/>
+            <a:r>
+              <a:rPr lang="en-US" sz="1200" b="1" dirty="0">
+                <a:solidFill>
+                  <a:schemeClr val="bg1"/>
+                </a:solidFill>
+              </a:rPr>
+              <a:t>page faults = . . .</a:t>
+            </a:r>
+          </a:p>
+          <a:p>
+            <a:pPr lvl="1"/>
+            <a:r>
+              <a:rPr lang="en-US" sz="1200" b="1" dirty="0">
+                <a:solidFill>
+                  <a:schemeClr val="bg1"/>
+                </a:solidFill>
+              </a:rPr>
+              <a:t>context switches = . . . </a:t>
+            </a:r>
+          </a:p>
+          <a:p>
+            <a:pPr lvl="1"/>
+            <a:r>
+              <a:rPr lang="en-US" sz="1200" b="1" dirty="0">
+                <a:solidFill>
+                  <a:schemeClr val="bg1"/>
+                </a:solidFill>
+              </a:rPr>
+              <a:t>blocks = . . . </a:t>
+            </a:r>
+          </a:p>
+        </p:txBody>
+      </p:sp>
+    </p:spTree>
+    <p:extLst>
+      <p:ext uri="{BB962C8B-B14F-4D97-AF65-F5344CB8AC3E}">
+        <p14:creationId xmlns:p14="http://schemas.microsoft.com/office/powerpoint/2010/main" val="4075444557"/>
+      </p:ext>
+    </p:extLst>
+  </p:cSld>
+  <p:clrMapOvr>
+    <a:masterClrMapping/>
+  </p:clrMapOvr>
+</p:sld>
+</file>
+
+<file path=ppt/slides/slide7.xml><?xml version="1.0" encoding="utf-8"?>
+<p:sld xmlns:a="http://schemas.openxmlformats.org/drawingml/2006/main" xmlns:r="http://schemas.openxmlformats.org/officeDocument/2006/relationships" xmlns:p="http://schemas.openxmlformats.org/presentationml/2006/main">
+  <p:cSld>
+    <p:spTree>
+      <p:nvGrpSpPr>
+        <p:cNvPr id="1" name=""/>
+        <p:cNvGrpSpPr/>
+        <p:nvPr/>
+      </p:nvGrpSpPr>
+      <p:grpSpPr>
+        <a:xfrm>
+          <a:off x="0" y="0"/>
+          <a:ext cx="0" cy="0"/>
+          <a:chOff x="0" y="0"/>
+          <a:chExt cx="0" cy="0"/>
+        </a:xfrm>
+      </p:grpSpPr>
+      <p:sp>
+        <p:nvSpPr>
+          <p:cNvPr id="5" name="Rectangle 4">
+            <a:extLst>
+              <a:ext uri="{FF2B5EF4-FFF2-40B4-BE49-F238E27FC236}">
+                <a16:creationId xmlns:a16="http://schemas.microsoft.com/office/drawing/2014/main" id="{E1333D68-D3C7-F51A-B144-21CB704623B3}"/>
+              </a:ext>
+            </a:extLst>
+          </p:cNvPr>
+          <p:cNvSpPr/>
+          <p:nvPr/>
+        </p:nvSpPr>
+        <p:spPr>
+          <a:xfrm>
+            <a:off x="992161" y="698500"/>
+            <a:ext cx="6146800" cy="5461000"/>
+          </a:xfrm>
+          <a:prstGeom prst="rect">
+            <a:avLst/>
+          </a:prstGeom>
+          <a:solidFill>
+            <a:schemeClr val="accent6"/>
+          </a:solidFill>
+          <a:ln>
+            <a:noFill/>
+          </a:ln>
+        </p:spPr>
+        <p:style>
+          <a:lnRef idx="2">
+            <a:schemeClr val="accent1">
+              <a:shade val="15000"/>
+            </a:schemeClr>
+          </a:lnRef>
+          <a:fillRef idx="1">
+            <a:schemeClr val="accent1"/>
+          </a:fillRef>
+          <a:effectRef idx="0">
+            <a:schemeClr val="accent1"/>
+          </a:effectRef>
+          <a:fontRef idx="minor">
+            <a:schemeClr val="lt1"/>
+          </a:fontRef>
+        </p:style>
+        <p:txBody>
+          <a:bodyPr rtlCol="0" anchor="ctr"/>
+          <a:lstStyle/>
+          <a:p>
+            <a:pPr algn="ctr"/>
+            <a:r>
+              <a:rPr kumimoji="0" lang="en-US" sz="9600" b="1" i="0" u="none" strike="noStrike" kern="1200" cap="none" spc="0" normalizeH="0" baseline="0" noProof="0" dirty="0">
+                <a:ln>
+                  <a:noFill/>
+                </a:ln>
+                <a:solidFill>
+                  <a:prstClr val="white"/>
+                </a:solidFill>
+                <a:effectLst/>
+                <a:uLnTx/>
+                <a:uFillTx/>
+                <a:latin typeface="Meiryo UI" panose="020B0604030504040204" pitchFamily="34" charset="-128"/>
+                <a:ea typeface="Meiryo UI" panose="020B0604030504040204" pitchFamily="34" charset="-128"/>
+                <a:cs typeface="+mn-cs"/>
+              </a:rPr>
+              <a:t>CASH</a:t>
+            </a:r>
+            <a:endParaRPr lang="en-US" sz="9600" dirty="0"/>
+          </a:p>
+          <a:p>
+            <a:endParaRPr lang="en-US" sz="9600" b="1" dirty="0">
+              <a:latin typeface="Meiryo UI" panose="020B0604030504040204" pitchFamily="34" charset="-128"/>
+              <a:ea typeface="Meiryo UI" panose="020B0604030504040204" pitchFamily="34" charset="-128"/>
+            </a:endParaRPr>
+          </a:p>
+        </p:txBody>
+      </p:sp>
+      <p:grpSp>
+        <p:nvGrpSpPr>
+          <p:cNvPr id="30" name="Group 29">
+            <a:extLst>
+              <a:ext uri="{FF2B5EF4-FFF2-40B4-BE49-F238E27FC236}">
+                <a16:creationId xmlns:a16="http://schemas.microsoft.com/office/drawing/2014/main" id="{985799FC-2968-BB75-8771-2D1F72ADE5A6}"/>
+              </a:ext>
+            </a:extLst>
+          </p:cNvPr>
+          <p:cNvGrpSpPr/>
+          <p:nvPr/>
+        </p:nvGrpSpPr>
+        <p:grpSpPr>
+          <a:xfrm>
+            <a:off x="3047147" y="3429000"/>
+            <a:ext cx="1874781" cy="1057211"/>
+            <a:chOff x="2894242" y="3468063"/>
+            <a:chExt cx="3322880" cy="1874363"/>
+          </a:xfrm>
+        </p:grpSpPr>
+        <p:pic>
+          <p:nvPicPr>
+            <p:cNvPr id="7" name="Graphic 6" descr="Database with solid fill">
+              <a:extLst>
+                <a:ext uri="{FF2B5EF4-FFF2-40B4-BE49-F238E27FC236}">
+                  <a16:creationId xmlns:a16="http://schemas.microsoft.com/office/drawing/2014/main" id="{51431F7D-C928-E23C-9E68-E9A83C89E1BA}"/>
+                </a:ext>
+              </a:extLst>
+            </p:cNvPr>
+            <p:cNvPicPr>
+              <a:picLocks noChangeAspect="1"/>
+            </p:cNvPicPr>
+            <p:nvPr/>
+          </p:nvPicPr>
+          <p:blipFill>
+            <a:blip r:embed="rId2">
+              <a:extLst>
+                <a:ext uri="{96DAC541-7B7A-43D3-8B79-37D633B846F1}">
+                  <asvg:svgBlip xmlns:asvg="http://schemas.microsoft.com/office/drawing/2016/SVG/main" r:embed="rId3"/>
+                </a:ext>
+              </a:extLst>
+            </a:blip>
+            <a:stretch>
+              <a:fillRect/>
+            </a:stretch>
+          </p:blipFill>
+          <p:spPr>
+            <a:xfrm>
+              <a:off x="4572343" y="3854688"/>
+              <a:ext cx="1403799" cy="1403799"/>
+            </a:xfrm>
+            <a:prstGeom prst="rect">
+              <a:avLst/>
+            </a:prstGeom>
+          </p:spPr>
+        </p:pic>
+        <p:sp>
+          <p:nvSpPr>
+            <p:cNvPr id="17" name="Oval 16">
+              <a:extLst>
+                <a:ext uri="{FF2B5EF4-FFF2-40B4-BE49-F238E27FC236}">
+                  <a16:creationId xmlns:a16="http://schemas.microsoft.com/office/drawing/2014/main" id="{89B02CB0-410A-1A05-FDD5-939329B55368}"/>
+                </a:ext>
+              </a:extLst>
+            </p:cNvPr>
+            <p:cNvSpPr/>
+            <p:nvPr/>
+          </p:nvSpPr>
+          <p:spPr>
+            <a:xfrm>
+              <a:off x="4320158" y="3468063"/>
+              <a:ext cx="1896964" cy="1874363"/>
+            </a:xfrm>
+            <a:prstGeom prst="ellipse">
+              <a:avLst/>
+            </a:prstGeom>
+            <a:noFill/>
+            <a:ln w="95250">
+              <a:solidFill>
+                <a:schemeClr val="bg1"/>
+              </a:solidFill>
+            </a:ln>
+          </p:spPr>
+          <p:style>
+            <a:lnRef idx="2">
+              <a:schemeClr val="accent1">
+                <a:shade val="15000"/>
+              </a:schemeClr>
+            </a:lnRef>
+            <a:fillRef idx="1">
+              <a:schemeClr val="accent1"/>
+            </a:fillRef>
+            <a:effectRef idx="0">
+              <a:schemeClr val="accent1"/>
+            </a:effectRef>
+            <a:fontRef idx="minor">
+              <a:schemeClr val="lt1"/>
+            </a:fontRef>
+          </p:style>
+          <p:txBody>
+            <a:bodyPr rtlCol="0" anchor="ctr"/>
+            <a:lstStyle/>
+            <a:p>
+              <a:pPr algn="ctr"/>
+              <a:endParaRPr lang="en-US"/>
+            </a:p>
+          </p:txBody>
+        </p:sp>
+        <p:sp>
+          <p:nvSpPr>
+            <p:cNvPr id="18" name="Rectangle 17">
+              <a:extLst>
+                <a:ext uri="{FF2B5EF4-FFF2-40B4-BE49-F238E27FC236}">
+                  <a16:creationId xmlns:a16="http://schemas.microsoft.com/office/drawing/2014/main" id="{1971DAEB-7262-44D0-3507-766B0E4FB3BC}"/>
+                </a:ext>
+              </a:extLst>
+            </p:cNvPr>
+            <p:cNvSpPr/>
+            <p:nvPr/>
+          </p:nvSpPr>
+          <p:spPr>
+            <a:xfrm rot="20309535">
+              <a:off x="3615465" y="4842139"/>
+              <a:ext cx="771978" cy="166850"/>
+            </a:xfrm>
+            <a:prstGeom prst="rect">
+              <a:avLst/>
+            </a:prstGeom>
+            <a:solidFill>
+              <a:schemeClr val="bg1"/>
+            </a:solidFill>
+            <a:ln>
+              <a:solidFill>
+                <a:schemeClr val="bg1"/>
+              </a:solidFill>
+            </a:ln>
+          </p:spPr>
+          <p:style>
+            <a:lnRef idx="2">
+              <a:schemeClr val="accent1">
+                <a:shade val="15000"/>
+              </a:schemeClr>
+            </a:lnRef>
+            <a:fillRef idx="1">
+              <a:schemeClr val="accent1"/>
+            </a:fillRef>
+            <a:effectRef idx="0">
+              <a:schemeClr val="accent1"/>
+            </a:effectRef>
+            <a:fontRef idx="minor">
+              <a:schemeClr val="lt1"/>
+            </a:fontRef>
+          </p:style>
+          <p:txBody>
+            <a:bodyPr rtlCol="0" anchor="ctr"/>
+            <a:lstStyle/>
+            <a:p>
+              <a:pPr algn="ctr"/>
+              <a:endParaRPr lang="en-US"/>
+            </a:p>
+          </p:txBody>
+        </p:sp>
+        <p:sp>
+          <p:nvSpPr>
+            <p:cNvPr id="19" name="Rounded Rectangle 18">
+              <a:extLst>
+                <a:ext uri="{FF2B5EF4-FFF2-40B4-BE49-F238E27FC236}">
+                  <a16:creationId xmlns:a16="http://schemas.microsoft.com/office/drawing/2014/main" id="{1B056039-FA7C-E7EA-923E-ED35DA656D52}"/>
+                </a:ext>
+              </a:extLst>
+            </p:cNvPr>
+            <p:cNvSpPr/>
+            <p:nvPr/>
+          </p:nvSpPr>
+          <p:spPr>
+            <a:xfrm rot="20354357">
+              <a:off x="2894242" y="4941851"/>
+              <a:ext cx="1264278" cy="337290"/>
+            </a:xfrm>
+            <a:prstGeom prst="roundRect">
+              <a:avLst/>
+            </a:prstGeom>
+            <a:solidFill>
+              <a:schemeClr val="bg1"/>
+            </a:solidFill>
+            <a:ln>
+              <a:solidFill>
+                <a:schemeClr val="bg1"/>
+              </a:solidFill>
+            </a:ln>
+          </p:spPr>
+          <p:style>
+            <a:lnRef idx="2">
+              <a:schemeClr val="accent1">
+                <a:shade val="15000"/>
+              </a:schemeClr>
+            </a:lnRef>
+            <a:fillRef idx="1">
+              <a:schemeClr val="accent1"/>
+            </a:fillRef>
+            <a:effectRef idx="0">
+              <a:schemeClr val="accent1"/>
+            </a:effectRef>
+            <a:fontRef idx="minor">
+              <a:schemeClr val="lt1"/>
+            </a:fontRef>
+          </p:style>
+          <p:txBody>
+            <a:bodyPr rtlCol="0" anchor="ctr"/>
+            <a:lstStyle/>
+            <a:p>
+              <a:pPr algn="ctr"/>
+              <a:endParaRPr lang="en-US"/>
+            </a:p>
+          </p:txBody>
+        </p:sp>
+        <p:cxnSp>
+          <p:nvCxnSpPr>
+            <p:cNvPr id="21" name="Straight Arrow Connector 20">
+              <a:extLst>
+                <a:ext uri="{FF2B5EF4-FFF2-40B4-BE49-F238E27FC236}">
+                  <a16:creationId xmlns:a16="http://schemas.microsoft.com/office/drawing/2014/main" id="{8EEC9C40-197C-5A1A-E6DC-6FE819A18615}"/>
+                </a:ext>
+              </a:extLst>
+            </p:cNvPr>
+            <p:cNvCxnSpPr>
+              <a:cxnSpLocks/>
+            </p:cNvCxnSpPr>
+            <p:nvPr/>
+          </p:nvCxnSpPr>
+          <p:spPr>
+            <a:xfrm>
+              <a:off x="4991725" y="3500200"/>
+              <a:ext cx="0" cy="464697"/>
+            </a:xfrm>
+            <a:prstGeom prst="straightConnector1">
+              <a:avLst/>
+            </a:prstGeom>
+            <a:ln>
+              <a:solidFill>
+                <a:schemeClr val="bg1"/>
+              </a:solidFill>
+              <a:tailEnd type="triangle"/>
+            </a:ln>
+          </p:spPr>
+          <p:style>
+            <a:lnRef idx="2">
+              <a:schemeClr val="accent1"/>
+            </a:lnRef>
+            <a:fillRef idx="0">
+              <a:schemeClr val="accent1"/>
+            </a:fillRef>
+            <a:effectRef idx="1">
+              <a:schemeClr val="accent1"/>
+            </a:effectRef>
+            <a:fontRef idx="minor">
+              <a:schemeClr val="tx1"/>
+            </a:fontRef>
+          </p:style>
+        </p:cxnSp>
+        <p:cxnSp>
+          <p:nvCxnSpPr>
+            <p:cNvPr id="22" name="Straight Arrow Connector 21">
+              <a:extLst>
+                <a:ext uri="{FF2B5EF4-FFF2-40B4-BE49-F238E27FC236}">
+                  <a16:creationId xmlns:a16="http://schemas.microsoft.com/office/drawing/2014/main" id="{FBC3AF00-691E-3EEF-D8FD-DAE5D20316C3}"/>
+                </a:ext>
+              </a:extLst>
+            </p:cNvPr>
+            <p:cNvCxnSpPr>
+              <a:cxnSpLocks/>
+            </p:cNvCxnSpPr>
+            <p:nvPr/>
+          </p:nvCxnSpPr>
+          <p:spPr>
+            <a:xfrm>
+              <a:off x="5268640" y="3468063"/>
+              <a:ext cx="0" cy="496834"/>
+            </a:xfrm>
+            <a:prstGeom prst="straightConnector1">
+              <a:avLst/>
+            </a:prstGeom>
+            <a:ln>
+              <a:solidFill>
+                <a:schemeClr val="bg1"/>
+              </a:solidFill>
+              <a:tailEnd type="triangle"/>
+            </a:ln>
+          </p:spPr>
+          <p:style>
+            <a:lnRef idx="2">
+              <a:schemeClr val="accent1"/>
+            </a:lnRef>
+            <a:fillRef idx="0">
+              <a:schemeClr val="accent1"/>
+            </a:fillRef>
+            <a:effectRef idx="1">
+              <a:schemeClr val="accent1"/>
+            </a:effectRef>
+            <a:fontRef idx="minor">
+              <a:schemeClr val="tx1"/>
+            </a:fontRef>
+          </p:style>
+        </p:cxnSp>
+        <p:cxnSp>
+          <p:nvCxnSpPr>
+            <p:cNvPr id="23" name="Straight Arrow Connector 22">
+              <a:extLst>
+                <a:ext uri="{FF2B5EF4-FFF2-40B4-BE49-F238E27FC236}">
+                  <a16:creationId xmlns:a16="http://schemas.microsoft.com/office/drawing/2014/main" id="{6B8B7230-B322-F4E9-0CC5-68B6BE61A4CD}"/>
+                </a:ext>
+              </a:extLst>
+            </p:cNvPr>
+            <p:cNvCxnSpPr/>
+            <p:nvPr/>
+          </p:nvCxnSpPr>
+          <p:spPr>
+            <a:xfrm>
+              <a:off x="5555952" y="3545172"/>
+              <a:ext cx="0" cy="419725"/>
+            </a:xfrm>
+            <a:prstGeom prst="straightConnector1">
+              <a:avLst/>
+            </a:prstGeom>
+            <a:ln>
+              <a:solidFill>
+                <a:schemeClr val="bg1"/>
+              </a:solidFill>
+              <a:tailEnd type="triangle"/>
+            </a:ln>
+          </p:spPr>
+          <p:style>
+            <a:lnRef idx="2">
+              <a:schemeClr val="accent1"/>
+            </a:lnRef>
+            <a:fillRef idx="0">
+              <a:schemeClr val="accent1"/>
+            </a:fillRef>
+            <a:effectRef idx="1">
+              <a:schemeClr val="accent1"/>
+            </a:effectRef>
+            <a:fontRef idx="minor">
+              <a:schemeClr val="tx1"/>
+            </a:fontRef>
+          </p:style>
+        </p:cxnSp>
+        <p:cxnSp>
+          <p:nvCxnSpPr>
+            <p:cNvPr id="24" name="Straight Arrow Connector 23">
+              <a:extLst>
+                <a:ext uri="{FF2B5EF4-FFF2-40B4-BE49-F238E27FC236}">
+                  <a16:creationId xmlns:a16="http://schemas.microsoft.com/office/drawing/2014/main" id="{05FDF6E9-4B09-09AC-9DB9-42A9930DA940}"/>
+                </a:ext>
+              </a:extLst>
+            </p:cNvPr>
+            <p:cNvCxnSpPr>
+              <a:cxnSpLocks/>
+            </p:cNvCxnSpPr>
+            <p:nvPr/>
+          </p:nvCxnSpPr>
+          <p:spPr>
+            <a:xfrm>
+              <a:off x="5431034" y="3468063"/>
+              <a:ext cx="0" cy="496834"/>
+            </a:xfrm>
+            <a:prstGeom prst="straightConnector1">
+              <a:avLst/>
+            </a:prstGeom>
+            <a:ln>
+              <a:solidFill>
+                <a:schemeClr val="bg1"/>
+              </a:solidFill>
+              <a:tailEnd type="triangle"/>
+            </a:ln>
+          </p:spPr>
+          <p:style>
+            <a:lnRef idx="2">
+              <a:schemeClr val="accent1"/>
+            </a:lnRef>
+            <a:fillRef idx="0">
+              <a:schemeClr val="accent1"/>
+            </a:fillRef>
+            <a:effectRef idx="1">
+              <a:schemeClr val="accent1"/>
+            </a:effectRef>
+            <a:fontRef idx="minor">
+              <a:schemeClr val="tx1"/>
+            </a:fontRef>
+          </p:style>
+        </p:cxnSp>
+        <p:cxnSp>
+          <p:nvCxnSpPr>
+            <p:cNvPr id="25" name="Straight Arrow Connector 24">
+              <a:extLst>
+                <a:ext uri="{FF2B5EF4-FFF2-40B4-BE49-F238E27FC236}">
+                  <a16:creationId xmlns:a16="http://schemas.microsoft.com/office/drawing/2014/main" id="{41CFD3DD-6B15-7D1E-3F2D-EC2AB1D439A5}"/>
+                </a:ext>
+              </a:extLst>
+            </p:cNvPr>
+            <p:cNvCxnSpPr>
+              <a:cxnSpLocks/>
+            </p:cNvCxnSpPr>
+            <p:nvPr/>
+          </p:nvCxnSpPr>
+          <p:spPr>
+            <a:xfrm>
+              <a:off x="5136630" y="3468063"/>
+              <a:ext cx="0" cy="496834"/>
+            </a:xfrm>
+            <a:prstGeom prst="straightConnector1">
+              <a:avLst/>
+            </a:prstGeom>
+            <a:ln>
+              <a:solidFill>
+                <a:schemeClr val="bg1"/>
+              </a:solidFill>
+              <a:tailEnd type="triangle"/>
+            </a:ln>
+          </p:spPr>
+          <p:style>
+            <a:lnRef idx="2">
+              <a:schemeClr val="accent1"/>
+            </a:lnRef>
+            <a:fillRef idx="0">
+              <a:schemeClr val="accent1"/>
+            </a:fillRef>
+            <a:effectRef idx="1">
+              <a:schemeClr val="accent1"/>
+            </a:effectRef>
+            <a:fontRef idx="minor">
+              <a:schemeClr val="tx1"/>
+            </a:fontRef>
+          </p:style>
+        </p:cxnSp>
+      </p:grpSp>
+    </p:spTree>
+    <p:extLst>
+      <p:ext uri="{BB962C8B-B14F-4D97-AF65-F5344CB8AC3E}">
+        <p14:creationId xmlns:p14="http://schemas.microsoft.com/office/powerpoint/2010/main" val="2708621152"/>
       </p:ext>
     </p:extLst>
   </p:cSld>

</xml_diff>

<commit_message>
Deploying to gh-pages from @ DaveedDomingo/daveeddomingo.github.io@d299b2bfbba0980c61920de310445b10af8526ed 🚀
</commit_message>
<xml_diff>
--- a/assets/img/logo-sizing.pptx
+++ b/assets/img/logo-sizing.pptx
@@ -5,12 +5,16 @@
     <p:sldMasterId id="2147483648" r:id="rId1"/>
   </p:sldMasterIdLst>
   <p:notesMasterIdLst>
-    <p:notesMasterId r:id="rId5"/>
+    <p:notesMasterId r:id="rId9"/>
   </p:notesMasterIdLst>
   <p:sldIdLst>
     <p:sldId id="256" r:id="rId2"/>
     <p:sldId id="257" r:id="rId3"/>
     <p:sldId id="258" r:id="rId4"/>
+    <p:sldId id="261" r:id="rId5"/>
+    <p:sldId id="259" r:id="rId6"/>
+    <p:sldId id="260" r:id="rId7"/>
+    <p:sldId id="262" r:id="rId8"/>
   </p:sldIdLst>
   <p:sldSz cx="12192000" cy="6858000"/>
   <p:notesSz cx="6858000" cy="9144000"/>
@@ -467,6 +471,90 @@
 </file>
 
 <file path=ppt/notesSlides/notesSlide1.xml><?xml version="1.0" encoding="utf-8"?>
+<p:notes xmlns:a="http://schemas.openxmlformats.org/drawingml/2006/main" xmlns:r="http://schemas.openxmlformats.org/officeDocument/2006/relationships" xmlns:p="http://schemas.openxmlformats.org/presentationml/2006/main">
+  <p:cSld>
+    <p:spTree>
+      <p:nvGrpSpPr>
+        <p:cNvPr id="1" name=""/>
+        <p:cNvGrpSpPr/>
+        <p:nvPr/>
+      </p:nvGrpSpPr>
+      <p:grpSpPr>
+        <a:xfrm>
+          <a:off x="0" y="0"/>
+          <a:ext cx="0" cy="0"/>
+          <a:chOff x="0" y="0"/>
+          <a:chExt cx="0" cy="0"/>
+        </a:xfrm>
+      </p:grpSpPr>
+      <p:sp>
+        <p:nvSpPr>
+          <p:cNvPr id="2" name="Slide Image Placeholder 1"/>
+          <p:cNvSpPr>
+            <a:spLocks noGrp="1" noRot="1" noChangeAspect="1"/>
+          </p:cNvSpPr>
+          <p:nvPr>
+            <p:ph type="sldImg"/>
+          </p:nvPr>
+        </p:nvSpPr>
+        <p:spPr/>
+      </p:sp>
+      <p:sp>
+        <p:nvSpPr>
+          <p:cNvPr id="3" name="Notes Placeholder 2"/>
+          <p:cNvSpPr>
+            <a:spLocks noGrp="1"/>
+          </p:cNvSpPr>
+          <p:nvPr>
+            <p:ph type="body" idx="1"/>
+          </p:nvPr>
+        </p:nvSpPr>
+        <p:spPr/>
+        <p:txBody>
+          <a:bodyPr/>
+          <a:lstStyle/>
+          <a:p>
+            <a:endParaRPr lang="en-US" dirty="0"/>
+          </a:p>
+        </p:txBody>
+      </p:sp>
+      <p:sp>
+        <p:nvSpPr>
+          <p:cNvPr id="4" name="Slide Number Placeholder 3"/>
+          <p:cNvSpPr>
+            <a:spLocks noGrp="1"/>
+          </p:cNvSpPr>
+          <p:nvPr>
+            <p:ph type="sldNum" sz="quarter" idx="5"/>
+          </p:nvPr>
+        </p:nvSpPr>
+        <p:spPr/>
+        <p:txBody>
+          <a:bodyPr/>
+          <a:lstStyle/>
+          <a:p>
+            <a:fld id="{94EAE24F-5C62-894A-8271-19E871F14ECE}" type="slidenum">
+              <a:rPr lang="en-US" smtClean="0"/>
+              <a:t>2</a:t>
+            </a:fld>
+            <a:endParaRPr lang="en-US"/>
+          </a:p>
+        </p:txBody>
+      </p:sp>
+    </p:spTree>
+    <p:extLst>
+      <p:ext uri="{BB962C8B-B14F-4D97-AF65-F5344CB8AC3E}">
+        <p14:creationId xmlns:p14="http://schemas.microsoft.com/office/powerpoint/2010/main" val="1416978323"/>
+      </p:ext>
+    </p:extLst>
+  </p:cSld>
+  <p:clrMapOvr>
+    <a:masterClrMapping/>
+  </p:clrMapOvr>
+</p:notes>
+</file>
+
+<file path=ppt/notesSlides/notesSlide2.xml><?xml version="1.0" encoding="utf-8"?>
 <p:notes xmlns:a="http://schemas.openxmlformats.org/drawingml/2006/main" xmlns:r="http://schemas.openxmlformats.org/officeDocument/2006/relationships" xmlns:p="http://schemas.openxmlformats.org/presentationml/2006/main">
   <p:cSld>
     <p:spTree>
@@ -3859,14 +3947,14 @@
           <p:nvPr/>
         </p:nvPicPr>
         <p:blipFill>
-          <a:blip r:embed="rId2"/>
+          <a:blip r:embed="rId3"/>
           <a:stretch>
             <a:fillRect/>
           </a:stretch>
         </p:blipFill>
         <p:spPr>
           <a:xfrm>
-            <a:off x="705191" y="547008"/>
+            <a:off x="1050879" y="190169"/>
             <a:ext cx="6146686" cy="5463721"/>
           </a:xfrm>
           <a:prstGeom prst="rect">
@@ -3889,13 +3977,13 @@
           <p:nvPr/>
         </p:nvPicPr>
         <p:blipFill>
-          <a:blip r:embed="rId3"/>
+          <a:blip r:embed="rId4"/>
           <a:srcRect t="8899" b="2214"/>
           <a:stretch/>
         </p:blipFill>
         <p:spPr>
           <a:xfrm>
-            <a:off x="8413409" y="842146"/>
+            <a:off x="1050879" y="187448"/>
             <a:ext cx="6146799" cy="5463721"/>
           </a:xfrm>
           <a:prstGeom prst="rect">
@@ -3905,10 +3993,10 @@
       </p:pic>
       <p:pic>
         <p:nvPicPr>
-          <p:cNvPr id="3" name="Picture 2" descr="A blue sign with white arrows and words&#10;&#10;AI-generated content may be incorrect.">
-            <a:extLst>
-              <a:ext uri="{FF2B5EF4-FFF2-40B4-BE49-F238E27FC236}">
-                <a16:creationId xmlns:a16="http://schemas.microsoft.com/office/drawing/2014/main" id="{7474434E-AB0B-B9FE-63D9-8EC1E37E3E8E}"/>
+          <p:cNvPr id="8" name="Picture 7" descr="A black background with white text&#10;&#10;AI-generated content may be incorrect.">
+            <a:extLst>
+              <a:ext uri="{FF2B5EF4-FFF2-40B4-BE49-F238E27FC236}">
+                <a16:creationId xmlns:a16="http://schemas.microsoft.com/office/drawing/2014/main" id="{2EB7B12E-B4CD-9CE4-D17E-8DB6B27487DD}"/>
               </a:ext>
             </a:extLst>
           </p:cNvPr>
@@ -3918,15 +4006,104 @@
           <p:nvPr/>
         </p:nvPicPr>
         <p:blipFill>
-          <a:blip r:embed="rId4"/>
+          <a:blip r:embed="rId5"/>
+          <a:srcRect b="2057"/>
+          <a:stretch/>
+        </p:blipFill>
+        <p:spPr>
+          <a:xfrm>
+            <a:off x="9216130" y="685800"/>
+            <a:ext cx="6146685" cy="5463721"/>
+          </a:xfrm>
+          <a:prstGeom prst="rect">
+            <a:avLst/>
+          </a:prstGeom>
+        </p:spPr>
+      </p:pic>
+      <p:pic>
+        <p:nvPicPr>
+          <p:cNvPr id="12" name="Picture 11" descr="A blue background with white text&#10;&#10;AI-generated content may be incorrect.">
+            <a:extLst>
+              <a:ext uri="{FF2B5EF4-FFF2-40B4-BE49-F238E27FC236}">
+                <a16:creationId xmlns:a16="http://schemas.microsoft.com/office/drawing/2014/main" id="{9260412E-A075-2242-C24A-D4BCA6343DCB}"/>
+              </a:ext>
+            </a:extLst>
+          </p:cNvPr>
+          <p:cNvPicPr>
+            <a:picLocks noChangeAspect="1"/>
+          </p:cNvPicPr>
+          <p:nvPr/>
+        </p:nvPicPr>
+        <p:blipFill>
+          <a:blip r:embed="rId6"/>
           <a:stretch>
             <a:fillRect/>
           </a:stretch>
         </p:blipFill>
         <p:spPr>
           <a:xfrm>
-            <a:off x="705191" y="547008"/>
-            <a:ext cx="6167297" cy="5463720"/>
+            <a:off x="5133391" y="708479"/>
+            <a:ext cx="6146800" cy="5486400"/>
+          </a:xfrm>
+          <a:prstGeom prst="rect">
+            <a:avLst/>
+          </a:prstGeom>
+        </p:spPr>
+      </p:pic>
+      <p:pic>
+        <p:nvPicPr>
+          <p:cNvPr id="16" name="Picture 15" descr="A blue background with white arrows and text&#10;&#10;AI-generated content may be incorrect.">
+            <a:extLst>
+              <a:ext uri="{FF2B5EF4-FFF2-40B4-BE49-F238E27FC236}">
+                <a16:creationId xmlns:a16="http://schemas.microsoft.com/office/drawing/2014/main" id="{346E7F9B-469F-87EF-AF53-4B7153F1ACD6}"/>
+              </a:ext>
+            </a:extLst>
+          </p:cNvPr>
+          <p:cNvPicPr>
+            <a:picLocks noChangeAspect="1"/>
+          </p:cNvPicPr>
+          <p:nvPr/>
+        </p:nvPicPr>
+        <p:blipFill>
+          <a:blip r:embed="rId7"/>
+          <a:stretch>
+            <a:fillRect/>
+          </a:stretch>
+        </p:blipFill>
+        <p:spPr>
+          <a:xfrm>
+            <a:off x="1050879" y="190169"/>
+            <a:ext cx="6146800" cy="5461000"/>
+          </a:xfrm>
+          <a:prstGeom prst="rect">
+            <a:avLst/>
+          </a:prstGeom>
+        </p:spPr>
+      </p:pic>
+      <p:pic>
+        <p:nvPicPr>
+          <p:cNvPr id="18" name="Picture 17" descr="A green sign with white text and a magnifying glass&#10;&#10;AI-generated content may be incorrect.">
+            <a:extLst>
+              <a:ext uri="{FF2B5EF4-FFF2-40B4-BE49-F238E27FC236}">
+                <a16:creationId xmlns:a16="http://schemas.microsoft.com/office/drawing/2014/main" id="{1696390E-E9DC-DEA3-935E-CBA67F5047B3}"/>
+              </a:ext>
+            </a:extLst>
+          </p:cNvPr>
+          <p:cNvPicPr>
+            <a:picLocks noChangeAspect="1"/>
+          </p:cNvPicPr>
+          <p:nvPr/>
+        </p:nvPicPr>
+        <p:blipFill>
+          <a:blip r:embed="rId8"/>
+          <a:stretch>
+            <a:fillRect/>
+          </a:stretch>
+        </p:blipFill>
+        <p:spPr>
+          <a:xfrm>
+            <a:off x="753962" y="187448"/>
+            <a:ext cx="6146800" cy="5486400"/>
           </a:xfrm>
           <a:prstGeom prst="rect">
             <a:avLst/>
@@ -4364,6 +4541,1117 @@
     <p:extLst>
       <p:ext uri="{BB962C8B-B14F-4D97-AF65-F5344CB8AC3E}">
         <p14:creationId xmlns:p14="http://schemas.microsoft.com/office/powerpoint/2010/main" val="3243502926"/>
+      </p:ext>
+    </p:extLst>
+  </p:cSld>
+  <p:clrMapOvr>
+    <a:masterClrMapping/>
+  </p:clrMapOvr>
+</p:sld>
+</file>
+
+<file path=ppt/slides/slide4.xml><?xml version="1.0" encoding="utf-8"?>
+<p:sld xmlns:a="http://schemas.openxmlformats.org/drawingml/2006/main" xmlns:r="http://schemas.openxmlformats.org/officeDocument/2006/relationships" xmlns:p="http://schemas.openxmlformats.org/presentationml/2006/main">
+  <p:cSld>
+    <p:spTree>
+      <p:nvGrpSpPr>
+        <p:cNvPr id="1" name=""/>
+        <p:cNvGrpSpPr/>
+        <p:nvPr/>
+      </p:nvGrpSpPr>
+      <p:grpSpPr>
+        <a:xfrm>
+          <a:off x="0" y="0"/>
+          <a:ext cx="0" cy="0"/>
+          <a:chOff x="0" y="0"/>
+          <a:chExt cx="0" cy="0"/>
+        </a:xfrm>
+      </p:grpSpPr>
+      <p:pic>
+        <p:nvPicPr>
+          <p:cNvPr id="4" name="Picture 3" descr="A blue sign with white arrows and words&#10;&#10;AI-generated content may be incorrect.">
+            <a:extLst>
+              <a:ext uri="{FF2B5EF4-FFF2-40B4-BE49-F238E27FC236}">
+                <a16:creationId xmlns:a16="http://schemas.microsoft.com/office/drawing/2014/main" id="{B222EF90-2424-0956-3AF9-DEF1F832BFDA}"/>
+              </a:ext>
+            </a:extLst>
+          </p:cNvPr>
+          <p:cNvPicPr>
+            <a:picLocks noChangeAspect="1"/>
+          </p:cNvPicPr>
+          <p:nvPr/>
+        </p:nvPicPr>
+        <p:blipFill>
+          <a:blip r:embed="rId2"/>
+          <a:srcRect l="332" t="-1" r="550" b="550"/>
+          <a:stretch/>
+        </p:blipFill>
+        <p:spPr>
+          <a:xfrm>
+            <a:off x="1875956" y="513553"/>
+            <a:ext cx="6146686" cy="5463721"/>
+          </a:xfrm>
+          <a:prstGeom prst="rect">
+            <a:avLst/>
+          </a:prstGeom>
+        </p:spPr>
+      </p:pic>
+      <p:pic>
+        <p:nvPicPr>
+          <p:cNvPr id="5" name="Picture 4" descr="A blue sign with white arrows and words&#10;&#10;AI-generated content may be incorrect.">
+            <a:extLst>
+              <a:ext uri="{FF2B5EF4-FFF2-40B4-BE49-F238E27FC236}">
+                <a16:creationId xmlns:a16="http://schemas.microsoft.com/office/drawing/2014/main" id="{673DDDF4-15DD-03CE-4F8C-D128C7E0927D}"/>
+              </a:ext>
+            </a:extLst>
+          </p:cNvPr>
+          <p:cNvPicPr>
+            <a:picLocks noChangeAspect="1"/>
+          </p:cNvPicPr>
+          <p:nvPr/>
+        </p:nvPicPr>
+        <p:blipFill>
+          <a:blip r:embed="rId2"/>
+          <a:srcRect l="332" t="-1" r="550" b="550"/>
+          <a:stretch/>
+        </p:blipFill>
+        <p:spPr>
+          <a:xfrm>
+            <a:off x="3916629" y="880726"/>
+            <a:ext cx="6146686" cy="5463721"/>
+          </a:xfrm>
+          <a:prstGeom prst="rect">
+            <a:avLst/>
+          </a:prstGeom>
+        </p:spPr>
+      </p:pic>
+      <p:pic>
+        <p:nvPicPr>
+          <p:cNvPr id="6" name="Picture 5" descr="A blue sign with white arrows and words&#10;&#10;AI-generated content may be incorrect.">
+            <a:extLst>
+              <a:ext uri="{FF2B5EF4-FFF2-40B4-BE49-F238E27FC236}">
+                <a16:creationId xmlns:a16="http://schemas.microsoft.com/office/drawing/2014/main" id="{3D553D86-3F6F-D42F-9DC1-951D04A42393}"/>
+              </a:ext>
+            </a:extLst>
+          </p:cNvPr>
+          <p:cNvPicPr>
+            <a:picLocks noChangeAspect="1"/>
+          </p:cNvPicPr>
+          <p:nvPr/>
+        </p:nvPicPr>
+        <p:blipFill>
+          <a:blip r:embed="rId2"/>
+          <a:srcRect l="1429" t="-1" r="550" b="550"/>
+          <a:stretch/>
+        </p:blipFill>
+        <p:spPr>
+          <a:xfrm>
+            <a:off x="4365496" y="1094127"/>
+            <a:ext cx="5427713" cy="4878612"/>
+          </a:xfrm>
+          <a:prstGeom prst="rect">
+            <a:avLst/>
+          </a:prstGeom>
+        </p:spPr>
+      </p:pic>
+    </p:spTree>
+    <p:extLst>
+      <p:ext uri="{BB962C8B-B14F-4D97-AF65-F5344CB8AC3E}">
+        <p14:creationId xmlns:p14="http://schemas.microsoft.com/office/powerpoint/2010/main" val="4272608065"/>
+      </p:ext>
+    </p:extLst>
+  </p:cSld>
+  <p:clrMapOvr>
+    <a:masterClrMapping/>
+  </p:clrMapOvr>
+</p:sld>
+</file>
+
+<file path=ppt/slides/slide5.xml><?xml version="1.0" encoding="utf-8"?>
+<p:sld xmlns:a="http://schemas.openxmlformats.org/drawingml/2006/main" xmlns:r="http://schemas.openxmlformats.org/officeDocument/2006/relationships" xmlns:p="http://schemas.openxmlformats.org/presentationml/2006/main">
+  <p:cSld>
+    <p:spTree>
+      <p:nvGrpSpPr>
+        <p:cNvPr id="1" name=""/>
+        <p:cNvGrpSpPr/>
+        <p:nvPr/>
+      </p:nvGrpSpPr>
+      <p:grpSpPr>
+        <a:xfrm>
+          <a:off x="0" y="0"/>
+          <a:ext cx="0" cy="0"/>
+          <a:chOff x="0" y="0"/>
+          <a:chExt cx="0" cy="0"/>
+        </a:xfrm>
+      </p:grpSpPr>
+      <p:sp>
+        <p:nvSpPr>
+          <p:cNvPr id="4" name="Rectangle 3">
+            <a:extLst>
+              <a:ext uri="{FF2B5EF4-FFF2-40B4-BE49-F238E27FC236}">
+                <a16:creationId xmlns:a16="http://schemas.microsoft.com/office/drawing/2014/main" id="{F06D2323-545B-6D2B-7B7A-5FA6986B2899}"/>
+              </a:ext>
+            </a:extLst>
+          </p:cNvPr>
+          <p:cNvSpPr/>
+          <p:nvPr/>
+        </p:nvSpPr>
+        <p:spPr>
+          <a:xfrm>
+            <a:off x="5699978" y="547007"/>
+            <a:ext cx="6029905" cy="5463721"/>
+          </a:xfrm>
+          <a:prstGeom prst="rect">
+            <a:avLst/>
+          </a:prstGeom>
+          <a:solidFill>
+            <a:schemeClr val="tx1"/>
+          </a:solidFill>
+          <a:ln>
+            <a:solidFill>
+              <a:schemeClr val="tx1"/>
+            </a:solidFill>
+          </a:ln>
+        </p:spPr>
+        <p:style>
+          <a:lnRef idx="2">
+            <a:schemeClr val="accent1">
+              <a:shade val="15000"/>
+            </a:schemeClr>
+          </a:lnRef>
+          <a:fillRef idx="1">
+            <a:schemeClr val="accent1"/>
+          </a:fillRef>
+          <a:effectRef idx="0">
+            <a:schemeClr val="accent1"/>
+          </a:effectRef>
+          <a:fontRef idx="minor">
+            <a:schemeClr val="lt1"/>
+          </a:fontRef>
+        </p:style>
+        <p:txBody>
+          <a:bodyPr rtlCol="0" anchor="ctr"/>
+          <a:lstStyle/>
+          <a:p>
+            <a:pPr algn="ctr"/>
+            <a:r>
+              <a:rPr lang="en-US" sz="4800" b="1" dirty="0">
+                <a:latin typeface="Andale Mono" panose="020B0509000000000004" pitchFamily="49" charset="0"/>
+              </a:rPr>
+              <a:t>$CommandQueue</a:t>
+            </a:r>
+          </a:p>
+          <a:p>
+            <a:pPr algn="ctr"/>
+            <a:endParaRPr lang="en-US" sz="4800" b="1" dirty="0">
+              <a:latin typeface="Andale Mono" panose="020B0509000000000004" pitchFamily="49" charset="0"/>
+            </a:endParaRPr>
+          </a:p>
+          <a:p>
+            <a:pPr algn="ctr"/>
+            <a:endParaRPr lang="en-US" sz="4800" b="1" dirty="0">
+              <a:latin typeface="Andale Mono" panose="020B0509000000000004" pitchFamily="49" charset="0"/>
+            </a:endParaRPr>
+          </a:p>
+          <a:p>
+            <a:pPr algn="ctr"/>
+            <a:r>
+              <a:rPr lang="en-US" sz="3200" b="1" dirty="0">
+                <a:latin typeface="Andale Mono" panose="020B0509000000000004" pitchFamily="49" charset="0"/>
+              </a:rPr>
+              <a:t> </a:t>
+            </a:r>
+          </a:p>
+        </p:txBody>
+      </p:sp>
+      <p:sp>
+        <p:nvSpPr>
+          <p:cNvPr id="5" name="TextBox 4">
+            <a:extLst>
+              <a:ext uri="{FF2B5EF4-FFF2-40B4-BE49-F238E27FC236}">
+                <a16:creationId xmlns:a16="http://schemas.microsoft.com/office/drawing/2014/main" id="{5733F0AD-E08B-1747-A97D-2FA745059384}"/>
+              </a:ext>
+            </a:extLst>
+          </p:cNvPr>
+          <p:cNvSpPr txBox="1"/>
+          <p:nvPr/>
+        </p:nvSpPr>
+        <p:spPr>
+          <a:xfrm>
+            <a:off x="6517456" y="2397282"/>
+            <a:ext cx="4216527" cy="3139321"/>
+          </a:xfrm>
+          <a:prstGeom prst="rect">
+            <a:avLst/>
+          </a:prstGeom>
+          <a:noFill/>
+        </p:spPr>
+        <p:txBody>
+          <a:bodyPr wrap="square" rtlCol="0">
+            <a:spAutoFit/>
+          </a:bodyPr>
+          <a:lstStyle/>
+          <a:p>
+            <a:r>
+              <a:rPr kumimoji="0" lang="en-US" sz="4800" b="1" i="0" u="none" strike="noStrike" kern="1200" cap="none" spc="0" normalizeH="0" baseline="0" noProof="0" dirty="0">
+                <a:ln>
+                  <a:noFill/>
+                </a:ln>
+                <a:solidFill>
+                  <a:prstClr val="white"/>
+                </a:solidFill>
+                <a:effectLst/>
+                <a:uLnTx/>
+                <a:uFillTx/>
+                <a:latin typeface="Andale Mono" panose="020B0509000000000004" pitchFamily="49" charset="0"/>
+                <a:ea typeface="+mn-ea"/>
+                <a:cs typeface="+mn-cs"/>
+              </a:rPr>
+              <a:t>.......</a:t>
+            </a:r>
+            <a:br>
+              <a:rPr kumimoji="0" lang="en-US" sz="4800" b="1" i="0" u="none" strike="noStrike" kern="1200" cap="none" spc="0" normalizeH="0" baseline="0" noProof="0" dirty="0">
+                <a:ln>
+                  <a:noFill/>
+                </a:ln>
+                <a:solidFill>
+                  <a:prstClr val="white"/>
+                </a:solidFill>
+                <a:effectLst/>
+                <a:uLnTx/>
+                <a:uFillTx/>
+                <a:latin typeface="Andale Mono" panose="020B0509000000000004" pitchFamily="49" charset="0"/>
+                <a:ea typeface="+mn-ea"/>
+                <a:cs typeface="+mn-cs"/>
+              </a:rPr>
+            </a:br>
+            <a:r>
+              <a:rPr lang="en-US" sz="4800" b="1" dirty="0">
+                <a:solidFill>
+                  <a:prstClr val="white"/>
+                </a:solidFill>
+                <a:latin typeface="Andale Mono" panose="020B0509000000000004" pitchFamily="49" charset="0"/>
+              </a:rPr>
+              <a:t>....</a:t>
+            </a:r>
+          </a:p>
+          <a:p>
+            <a:r>
+              <a:rPr lang="en-US" sz="4800" b="1" dirty="0">
+                <a:solidFill>
+                  <a:prstClr val="white"/>
+                </a:solidFill>
+                <a:latin typeface="Andale Mono" panose="020B0509000000000004" pitchFamily="49" charset="0"/>
+              </a:rPr>
+              <a:t>.</a:t>
+            </a:r>
+          </a:p>
+          <a:p>
+            <a:r>
+              <a:rPr lang="en-US" sz="4800" b="1" dirty="0">
+                <a:solidFill>
+                  <a:prstClr val="white"/>
+                </a:solidFill>
+                <a:latin typeface="Andale Mono" panose="020B0509000000000004" pitchFamily="49" charset="0"/>
+              </a:rPr>
+              <a:t> </a:t>
+            </a:r>
+            <a:endParaRPr lang="en-US" sz="5400" b="1" dirty="0">
+              <a:solidFill>
+                <a:schemeClr val="bg1"/>
+              </a:solidFill>
+            </a:endParaRPr>
+          </a:p>
+        </p:txBody>
+      </p:sp>
+    </p:spTree>
+    <p:extLst>
+      <p:ext uri="{BB962C8B-B14F-4D97-AF65-F5344CB8AC3E}">
+        <p14:creationId xmlns:p14="http://schemas.microsoft.com/office/powerpoint/2010/main" val="4189953785"/>
+      </p:ext>
+    </p:extLst>
+  </p:cSld>
+  <p:clrMapOvr>
+    <a:masterClrMapping/>
+  </p:clrMapOvr>
+</p:sld>
+</file>
+
+<file path=ppt/slides/slide6.xml><?xml version="1.0" encoding="utf-8"?>
+<p:sld xmlns:a="http://schemas.openxmlformats.org/drawingml/2006/main" xmlns:r="http://schemas.openxmlformats.org/officeDocument/2006/relationships" xmlns:p="http://schemas.openxmlformats.org/presentationml/2006/main">
+  <p:cSld>
+    <p:spTree>
+      <p:nvGrpSpPr>
+        <p:cNvPr id="1" name=""/>
+        <p:cNvGrpSpPr/>
+        <p:nvPr/>
+      </p:nvGrpSpPr>
+      <p:grpSpPr>
+        <a:xfrm>
+          <a:off x="0" y="0"/>
+          <a:ext cx="0" cy="0"/>
+          <a:chOff x="0" y="0"/>
+          <a:chExt cx="0" cy="0"/>
+        </a:xfrm>
+      </p:grpSpPr>
+      <p:sp>
+        <p:nvSpPr>
+          <p:cNvPr id="5" name="Rectangle 4">
+            <a:extLst>
+              <a:ext uri="{FF2B5EF4-FFF2-40B4-BE49-F238E27FC236}">
+                <a16:creationId xmlns:a16="http://schemas.microsoft.com/office/drawing/2014/main" id="{FB4D3684-BEF6-6A35-2E23-B14762DB7BBD}"/>
+              </a:ext>
+            </a:extLst>
+          </p:cNvPr>
+          <p:cNvSpPr/>
+          <p:nvPr/>
+        </p:nvSpPr>
+        <p:spPr>
+          <a:xfrm>
+            <a:off x="1472637" y="697138"/>
+            <a:ext cx="6146685" cy="5463721"/>
+          </a:xfrm>
+          <a:prstGeom prst="rect">
+            <a:avLst/>
+          </a:prstGeom>
+          <a:ln>
+            <a:noFill/>
+          </a:ln>
+        </p:spPr>
+        <p:style>
+          <a:lnRef idx="2">
+            <a:schemeClr val="accent1">
+              <a:shade val="15000"/>
+            </a:schemeClr>
+          </a:lnRef>
+          <a:fillRef idx="1">
+            <a:schemeClr val="accent1"/>
+          </a:fillRef>
+          <a:effectRef idx="0">
+            <a:schemeClr val="accent1"/>
+          </a:effectRef>
+          <a:fontRef idx="minor">
+            <a:schemeClr val="lt1"/>
+          </a:fontRef>
+        </p:style>
+        <p:txBody>
+          <a:bodyPr rtlCol="0" anchor="ctr"/>
+          <a:lstStyle/>
+          <a:p>
+            <a:pPr algn="ctr"/>
+            <a:r>
+              <a:rPr lang="en-US" sz="5400" b="1" dirty="0"/>
+              <a:t>/</a:t>
+            </a:r>
+            <a:r>
+              <a:rPr lang="en-US" sz="5400" b="1" dirty="0" err="1"/>
+              <a:t>usr</a:t>
+            </a:r>
+            <a:r>
+              <a:rPr lang="en-US" sz="5400" b="1" dirty="0"/>
+              <a:t>/thread/time</a:t>
+            </a:r>
+          </a:p>
+          <a:p>
+            <a:pPr algn="ctr"/>
+            <a:endParaRPr lang="en-US" sz="5400" b="1" dirty="0"/>
+          </a:p>
+          <a:p>
+            <a:pPr algn="ctr"/>
+            <a:endParaRPr lang="en-US" sz="5400" b="1" dirty="0"/>
+          </a:p>
+          <a:p>
+            <a:pPr algn="ctr"/>
+            <a:endParaRPr lang="en-US" b="1" dirty="0"/>
+          </a:p>
+        </p:txBody>
+      </p:sp>
+      <p:sp>
+        <p:nvSpPr>
+          <p:cNvPr id="6" name="TextBox 5">
+            <a:extLst>
+              <a:ext uri="{FF2B5EF4-FFF2-40B4-BE49-F238E27FC236}">
+                <a16:creationId xmlns:a16="http://schemas.microsoft.com/office/drawing/2014/main" id="{F8D00DFB-DA65-841E-1263-2B5A3ACE5625}"/>
+              </a:ext>
+            </a:extLst>
+          </p:cNvPr>
+          <p:cNvSpPr txBox="1"/>
+          <p:nvPr/>
+        </p:nvSpPr>
+        <p:spPr>
+          <a:xfrm>
+            <a:off x="3453160" y="2921622"/>
+            <a:ext cx="2564780" cy="2123658"/>
+          </a:xfrm>
+          <a:prstGeom prst="rect">
+            <a:avLst/>
+          </a:prstGeom>
+          <a:noFill/>
+        </p:spPr>
+        <p:txBody>
+          <a:bodyPr wrap="square" rtlCol="0">
+            <a:spAutoFit/>
+          </a:bodyPr>
+          <a:lstStyle/>
+          <a:p>
+            <a:r>
+              <a:rPr lang="en-US" b="1" dirty="0">
+                <a:solidFill>
+                  <a:schemeClr val="bg1"/>
+                </a:solidFill>
+              </a:rPr>
+              <a:t>thread 0:</a:t>
+            </a:r>
+          </a:p>
+          <a:p>
+            <a:pPr lvl="1"/>
+            <a:r>
+              <a:rPr lang="en-US" sz="1200" b="1" dirty="0">
+                <a:solidFill>
+                  <a:schemeClr val="bg1"/>
+                </a:solidFill>
+              </a:rPr>
+              <a:t>memory = . . . </a:t>
+            </a:r>
+          </a:p>
+          <a:p>
+            <a:pPr lvl="1"/>
+            <a:r>
+              <a:rPr lang="en-US" sz="1200" b="1" dirty="0">
+                <a:solidFill>
+                  <a:schemeClr val="bg1"/>
+                </a:solidFill>
+              </a:rPr>
+              <a:t>page faults = . . .</a:t>
+            </a:r>
+          </a:p>
+          <a:p>
+            <a:pPr lvl="1"/>
+            <a:r>
+              <a:rPr lang="en-US" sz="1200" b="1" dirty="0">
+                <a:solidFill>
+                  <a:schemeClr val="bg1"/>
+                </a:solidFill>
+              </a:rPr>
+              <a:t>context switches = . . . </a:t>
+            </a:r>
+          </a:p>
+          <a:p>
+            <a:pPr lvl="1"/>
+            <a:r>
+              <a:rPr lang="en-US" sz="1200" b="1" dirty="0">
+                <a:solidFill>
+                  <a:schemeClr val="bg1"/>
+                </a:solidFill>
+              </a:rPr>
+              <a:t>blocks = . . . </a:t>
+            </a:r>
+            <a:endParaRPr lang="en-US" sz="1600" b="1" dirty="0">
+              <a:solidFill>
+                <a:schemeClr val="bg1"/>
+              </a:solidFill>
+            </a:endParaRPr>
+          </a:p>
+          <a:p>
+            <a:r>
+              <a:rPr lang="en-US" b="1" dirty="0">
+                <a:solidFill>
+                  <a:schemeClr val="bg1"/>
+                </a:solidFill>
+              </a:rPr>
+              <a:t>thread n:</a:t>
+            </a:r>
+          </a:p>
+          <a:p>
+            <a:pPr lvl="1"/>
+            <a:r>
+              <a:rPr lang="en-US" sz="1200" b="1" dirty="0">
+                <a:solidFill>
+                  <a:schemeClr val="bg1"/>
+                </a:solidFill>
+              </a:rPr>
+              <a:t>memory = . . . </a:t>
+            </a:r>
+          </a:p>
+          <a:p>
+            <a:pPr lvl="1"/>
+            <a:r>
+              <a:rPr lang="en-US" sz="1200" b="1" dirty="0">
+                <a:solidFill>
+                  <a:schemeClr val="bg1"/>
+                </a:solidFill>
+              </a:rPr>
+              <a:t>page faults = . . .</a:t>
+            </a:r>
+          </a:p>
+          <a:p>
+            <a:pPr lvl="1"/>
+            <a:r>
+              <a:rPr lang="en-US" sz="1200" b="1" dirty="0">
+                <a:solidFill>
+                  <a:schemeClr val="bg1"/>
+                </a:solidFill>
+              </a:rPr>
+              <a:t>context switches = . . . </a:t>
+            </a:r>
+          </a:p>
+          <a:p>
+            <a:pPr lvl="1"/>
+            <a:r>
+              <a:rPr lang="en-US" sz="1200" b="1" dirty="0">
+                <a:solidFill>
+                  <a:schemeClr val="bg1"/>
+                </a:solidFill>
+              </a:rPr>
+              <a:t>blocks = . . . </a:t>
+            </a:r>
+          </a:p>
+        </p:txBody>
+      </p:sp>
+    </p:spTree>
+    <p:extLst>
+      <p:ext uri="{BB962C8B-B14F-4D97-AF65-F5344CB8AC3E}">
+        <p14:creationId xmlns:p14="http://schemas.microsoft.com/office/powerpoint/2010/main" val="4075444557"/>
+      </p:ext>
+    </p:extLst>
+  </p:cSld>
+  <p:clrMapOvr>
+    <a:masterClrMapping/>
+  </p:clrMapOvr>
+</p:sld>
+</file>
+
+<file path=ppt/slides/slide7.xml><?xml version="1.0" encoding="utf-8"?>
+<p:sld xmlns:a="http://schemas.openxmlformats.org/drawingml/2006/main" xmlns:r="http://schemas.openxmlformats.org/officeDocument/2006/relationships" xmlns:p="http://schemas.openxmlformats.org/presentationml/2006/main">
+  <p:cSld>
+    <p:spTree>
+      <p:nvGrpSpPr>
+        <p:cNvPr id="1" name=""/>
+        <p:cNvGrpSpPr/>
+        <p:nvPr/>
+      </p:nvGrpSpPr>
+      <p:grpSpPr>
+        <a:xfrm>
+          <a:off x="0" y="0"/>
+          <a:ext cx="0" cy="0"/>
+          <a:chOff x="0" y="0"/>
+          <a:chExt cx="0" cy="0"/>
+        </a:xfrm>
+      </p:grpSpPr>
+      <p:sp>
+        <p:nvSpPr>
+          <p:cNvPr id="5" name="Rectangle 4">
+            <a:extLst>
+              <a:ext uri="{FF2B5EF4-FFF2-40B4-BE49-F238E27FC236}">
+                <a16:creationId xmlns:a16="http://schemas.microsoft.com/office/drawing/2014/main" id="{E1333D68-D3C7-F51A-B144-21CB704623B3}"/>
+              </a:ext>
+            </a:extLst>
+          </p:cNvPr>
+          <p:cNvSpPr/>
+          <p:nvPr/>
+        </p:nvSpPr>
+        <p:spPr>
+          <a:xfrm>
+            <a:off x="992161" y="698500"/>
+            <a:ext cx="6146800" cy="5461000"/>
+          </a:xfrm>
+          <a:prstGeom prst="rect">
+            <a:avLst/>
+          </a:prstGeom>
+          <a:solidFill>
+            <a:schemeClr val="accent6"/>
+          </a:solidFill>
+          <a:ln>
+            <a:noFill/>
+          </a:ln>
+        </p:spPr>
+        <p:style>
+          <a:lnRef idx="2">
+            <a:schemeClr val="accent1">
+              <a:shade val="15000"/>
+            </a:schemeClr>
+          </a:lnRef>
+          <a:fillRef idx="1">
+            <a:schemeClr val="accent1"/>
+          </a:fillRef>
+          <a:effectRef idx="0">
+            <a:schemeClr val="accent1"/>
+          </a:effectRef>
+          <a:fontRef idx="minor">
+            <a:schemeClr val="lt1"/>
+          </a:fontRef>
+        </p:style>
+        <p:txBody>
+          <a:bodyPr rtlCol="0" anchor="ctr"/>
+          <a:lstStyle/>
+          <a:p>
+            <a:pPr algn="ctr"/>
+            <a:r>
+              <a:rPr kumimoji="0" lang="en-US" sz="9600" b="1" i="0" u="none" strike="noStrike" kern="1200" cap="none" spc="0" normalizeH="0" baseline="0" noProof="0" dirty="0">
+                <a:ln>
+                  <a:noFill/>
+                </a:ln>
+                <a:solidFill>
+                  <a:prstClr val="white"/>
+                </a:solidFill>
+                <a:effectLst/>
+                <a:uLnTx/>
+                <a:uFillTx/>
+                <a:latin typeface="Meiryo UI" panose="020B0604030504040204" pitchFamily="34" charset="-128"/>
+                <a:ea typeface="Meiryo UI" panose="020B0604030504040204" pitchFamily="34" charset="-128"/>
+                <a:cs typeface="+mn-cs"/>
+              </a:rPr>
+              <a:t>CASH</a:t>
+            </a:r>
+            <a:endParaRPr lang="en-US" sz="9600" dirty="0"/>
+          </a:p>
+          <a:p>
+            <a:endParaRPr lang="en-US" sz="9600" b="1" dirty="0">
+              <a:latin typeface="Meiryo UI" panose="020B0604030504040204" pitchFamily="34" charset="-128"/>
+              <a:ea typeface="Meiryo UI" panose="020B0604030504040204" pitchFamily="34" charset="-128"/>
+            </a:endParaRPr>
+          </a:p>
+        </p:txBody>
+      </p:sp>
+      <p:grpSp>
+        <p:nvGrpSpPr>
+          <p:cNvPr id="30" name="Group 29">
+            <a:extLst>
+              <a:ext uri="{FF2B5EF4-FFF2-40B4-BE49-F238E27FC236}">
+                <a16:creationId xmlns:a16="http://schemas.microsoft.com/office/drawing/2014/main" id="{985799FC-2968-BB75-8771-2D1F72ADE5A6}"/>
+              </a:ext>
+            </a:extLst>
+          </p:cNvPr>
+          <p:cNvGrpSpPr/>
+          <p:nvPr/>
+        </p:nvGrpSpPr>
+        <p:grpSpPr>
+          <a:xfrm>
+            <a:off x="3047147" y="3429000"/>
+            <a:ext cx="1874781" cy="1057211"/>
+            <a:chOff x="2894242" y="3468063"/>
+            <a:chExt cx="3322880" cy="1874363"/>
+          </a:xfrm>
+        </p:grpSpPr>
+        <p:pic>
+          <p:nvPicPr>
+            <p:cNvPr id="7" name="Graphic 6" descr="Database with solid fill">
+              <a:extLst>
+                <a:ext uri="{FF2B5EF4-FFF2-40B4-BE49-F238E27FC236}">
+                  <a16:creationId xmlns:a16="http://schemas.microsoft.com/office/drawing/2014/main" id="{51431F7D-C928-E23C-9E68-E9A83C89E1BA}"/>
+                </a:ext>
+              </a:extLst>
+            </p:cNvPr>
+            <p:cNvPicPr>
+              <a:picLocks noChangeAspect="1"/>
+            </p:cNvPicPr>
+            <p:nvPr/>
+          </p:nvPicPr>
+          <p:blipFill>
+            <a:blip r:embed="rId2">
+              <a:extLst>
+                <a:ext uri="{96DAC541-7B7A-43D3-8B79-37D633B846F1}">
+                  <asvg:svgBlip xmlns:asvg="http://schemas.microsoft.com/office/drawing/2016/SVG/main" r:embed="rId3"/>
+                </a:ext>
+              </a:extLst>
+            </a:blip>
+            <a:stretch>
+              <a:fillRect/>
+            </a:stretch>
+          </p:blipFill>
+          <p:spPr>
+            <a:xfrm>
+              <a:off x="4572343" y="3854688"/>
+              <a:ext cx="1403799" cy="1403799"/>
+            </a:xfrm>
+            <a:prstGeom prst="rect">
+              <a:avLst/>
+            </a:prstGeom>
+          </p:spPr>
+        </p:pic>
+        <p:sp>
+          <p:nvSpPr>
+            <p:cNvPr id="17" name="Oval 16">
+              <a:extLst>
+                <a:ext uri="{FF2B5EF4-FFF2-40B4-BE49-F238E27FC236}">
+                  <a16:creationId xmlns:a16="http://schemas.microsoft.com/office/drawing/2014/main" id="{89B02CB0-410A-1A05-FDD5-939329B55368}"/>
+                </a:ext>
+              </a:extLst>
+            </p:cNvPr>
+            <p:cNvSpPr/>
+            <p:nvPr/>
+          </p:nvSpPr>
+          <p:spPr>
+            <a:xfrm>
+              <a:off x="4320158" y="3468063"/>
+              <a:ext cx="1896964" cy="1874363"/>
+            </a:xfrm>
+            <a:prstGeom prst="ellipse">
+              <a:avLst/>
+            </a:prstGeom>
+            <a:noFill/>
+            <a:ln w="95250">
+              <a:solidFill>
+                <a:schemeClr val="bg1"/>
+              </a:solidFill>
+            </a:ln>
+          </p:spPr>
+          <p:style>
+            <a:lnRef idx="2">
+              <a:schemeClr val="accent1">
+                <a:shade val="15000"/>
+              </a:schemeClr>
+            </a:lnRef>
+            <a:fillRef idx="1">
+              <a:schemeClr val="accent1"/>
+            </a:fillRef>
+            <a:effectRef idx="0">
+              <a:schemeClr val="accent1"/>
+            </a:effectRef>
+            <a:fontRef idx="minor">
+              <a:schemeClr val="lt1"/>
+            </a:fontRef>
+          </p:style>
+          <p:txBody>
+            <a:bodyPr rtlCol="0" anchor="ctr"/>
+            <a:lstStyle/>
+            <a:p>
+              <a:pPr algn="ctr"/>
+              <a:endParaRPr lang="en-US"/>
+            </a:p>
+          </p:txBody>
+        </p:sp>
+        <p:sp>
+          <p:nvSpPr>
+            <p:cNvPr id="18" name="Rectangle 17">
+              <a:extLst>
+                <a:ext uri="{FF2B5EF4-FFF2-40B4-BE49-F238E27FC236}">
+                  <a16:creationId xmlns:a16="http://schemas.microsoft.com/office/drawing/2014/main" id="{1971DAEB-7262-44D0-3507-766B0E4FB3BC}"/>
+                </a:ext>
+              </a:extLst>
+            </p:cNvPr>
+            <p:cNvSpPr/>
+            <p:nvPr/>
+          </p:nvSpPr>
+          <p:spPr>
+            <a:xfrm rot="20309535">
+              <a:off x="3615465" y="4842139"/>
+              <a:ext cx="771978" cy="166850"/>
+            </a:xfrm>
+            <a:prstGeom prst="rect">
+              <a:avLst/>
+            </a:prstGeom>
+            <a:solidFill>
+              <a:schemeClr val="bg1"/>
+            </a:solidFill>
+            <a:ln>
+              <a:solidFill>
+                <a:schemeClr val="bg1"/>
+              </a:solidFill>
+            </a:ln>
+          </p:spPr>
+          <p:style>
+            <a:lnRef idx="2">
+              <a:schemeClr val="accent1">
+                <a:shade val="15000"/>
+              </a:schemeClr>
+            </a:lnRef>
+            <a:fillRef idx="1">
+              <a:schemeClr val="accent1"/>
+            </a:fillRef>
+            <a:effectRef idx="0">
+              <a:schemeClr val="accent1"/>
+            </a:effectRef>
+            <a:fontRef idx="minor">
+              <a:schemeClr val="lt1"/>
+            </a:fontRef>
+          </p:style>
+          <p:txBody>
+            <a:bodyPr rtlCol="0" anchor="ctr"/>
+            <a:lstStyle/>
+            <a:p>
+              <a:pPr algn="ctr"/>
+              <a:endParaRPr lang="en-US"/>
+            </a:p>
+          </p:txBody>
+        </p:sp>
+        <p:sp>
+          <p:nvSpPr>
+            <p:cNvPr id="19" name="Rounded Rectangle 18">
+              <a:extLst>
+                <a:ext uri="{FF2B5EF4-FFF2-40B4-BE49-F238E27FC236}">
+                  <a16:creationId xmlns:a16="http://schemas.microsoft.com/office/drawing/2014/main" id="{1B056039-FA7C-E7EA-923E-ED35DA656D52}"/>
+                </a:ext>
+              </a:extLst>
+            </p:cNvPr>
+            <p:cNvSpPr/>
+            <p:nvPr/>
+          </p:nvSpPr>
+          <p:spPr>
+            <a:xfrm rot="20354357">
+              <a:off x="2894242" y="4941851"/>
+              <a:ext cx="1264278" cy="337290"/>
+            </a:xfrm>
+            <a:prstGeom prst="roundRect">
+              <a:avLst/>
+            </a:prstGeom>
+            <a:solidFill>
+              <a:schemeClr val="bg1"/>
+            </a:solidFill>
+            <a:ln>
+              <a:solidFill>
+                <a:schemeClr val="bg1"/>
+              </a:solidFill>
+            </a:ln>
+          </p:spPr>
+          <p:style>
+            <a:lnRef idx="2">
+              <a:schemeClr val="accent1">
+                <a:shade val="15000"/>
+              </a:schemeClr>
+            </a:lnRef>
+            <a:fillRef idx="1">
+              <a:schemeClr val="accent1"/>
+            </a:fillRef>
+            <a:effectRef idx="0">
+              <a:schemeClr val="accent1"/>
+            </a:effectRef>
+            <a:fontRef idx="minor">
+              <a:schemeClr val="lt1"/>
+            </a:fontRef>
+          </p:style>
+          <p:txBody>
+            <a:bodyPr rtlCol="0" anchor="ctr"/>
+            <a:lstStyle/>
+            <a:p>
+              <a:pPr algn="ctr"/>
+              <a:endParaRPr lang="en-US"/>
+            </a:p>
+          </p:txBody>
+        </p:sp>
+        <p:cxnSp>
+          <p:nvCxnSpPr>
+            <p:cNvPr id="21" name="Straight Arrow Connector 20">
+              <a:extLst>
+                <a:ext uri="{FF2B5EF4-FFF2-40B4-BE49-F238E27FC236}">
+                  <a16:creationId xmlns:a16="http://schemas.microsoft.com/office/drawing/2014/main" id="{8EEC9C40-197C-5A1A-E6DC-6FE819A18615}"/>
+                </a:ext>
+              </a:extLst>
+            </p:cNvPr>
+            <p:cNvCxnSpPr>
+              <a:cxnSpLocks/>
+            </p:cNvCxnSpPr>
+            <p:nvPr/>
+          </p:nvCxnSpPr>
+          <p:spPr>
+            <a:xfrm>
+              <a:off x="4991725" y="3500200"/>
+              <a:ext cx="0" cy="464697"/>
+            </a:xfrm>
+            <a:prstGeom prst="straightConnector1">
+              <a:avLst/>
+            </a:prstGeom>
+            <a:ln>
+              <a:solidFill>
+                <a:schemeClr val="bg1"/>
+              </a:solidFill>
+              <a:tailEnd type="triangle"/>
+            </a:ln>
+          </p:spPr>
+          <p:style>
+            <a:lnRef idx="2">
+              <a:schemeClr val="accent1"/>
+            </a:lnRef>
+            <a:fillRef idx="0">
+              <a:schemeClr val="accent1"/>
+            </a:fillRef>
+            <a:effectRef idx="1">
+              <a:schemeClr val="accent1"/>
+            </a:effectRef>
+            <a:fontRef idx="minor">
+              <a:schemeClr val="tx1"/>
+            </a:fontRef>
+          </p:style>
+        </p:cxnSp>
+        <p:cxnSp>
+          <p:nvCxnSpPr>
+            <p:cNvPr id="22" name="Straight Arrow Connector 21">
+              <a:extLst>
+                <a:ext uri="{FF2B5EF4-FFF2-40B4-BE49-F238E27FC236}">
+                  <a16:creationId xmlns:a16="http://schemas.microsoft.com/office/drawing/2014/main" id="{FBC3AF00-691E-3EEF-D8FD-DAE5D20316C3}"/>
+                </a:ext>
+              </a:extLst>
+            </p:cNvPr>
+            <p:cNvCxnSpPr>
+              <a:cxnSpLocks/>
+            </p:cNvCxnSpPr>
+            <p:nvPr/>
+          </p:nvCxnSpPr>
+          <p:spPr>
+            <a:xfrm>
+              <a:off x="5268640" y="3468063"/>
+              <a:ext cx="0" cy="496834"/>
+            </a:xfrm>
+            <a:prstGeom prst="straightConnector1">
+              <a:avLst/>
+            </a:prstGeom>
+            <a:ln>
+              <a:solidFill>
+                <a:schemeClr val="bg1"/>
+              </a:solidFill>
+              <a:tailEnd type="triangle"/>
+            </a:ln>
+          </p:spPr>
+          <p:style>
+            <a:lnRef idx="2">
+              <a:schemeClr val="accent1"/>
+            </a:lnRef>
+            <a:fillRef idx="0">
+              <a:schemeClr val="accent1"/>
+            </a:fillRef>
+            <a:effectRef idx="1">
+              <a:schemeClr val="accent1"/>
+            </a:effectRef>
+            <a:fontRef idx="minor">
+              <a:schemeClr val="tx1"/>
+            </a:fontRef>
+          </p:style>
+        </p:cxnSp>
+        <p:cxnSp>
+          <p:nvCxnSpPr>
+            <p:cNvPr id="23" name="Straight Arrow Connector 22">
+              <a:extLst>
+                <a:ext uri="{FF2B5EF4-FFF2-40B4-BE49-F238E27FC236}">
+                  <a16:creationId xmlns:a16="http://schemas.microsoft.com/office/drawing/2014/main" id="{6B8B7230-B322-F4E9-0CC5-68B6BE61A4CD}"/>
+                </a:ext>
+              </a:extLst>
+            </p:cNvPr>
+            <p:cNvCxnSpPr/>
+            <p:nvPr/>
+          </p:nvCxnSpPr>
+          <p:spPr>
+            <a:xfrm>
+              <a:off x="5555952" y="3545172"/>
+              <a:ext cx="0" cy="419725"/>
+            </a:xfrm>
+            <a:prstGeom prst="straightConnector1">
+              <a:avLst/>
+            </a:prstGeom>
+            <a:ln>
+              <a:solidFill>
+                <a:schemeClr val="bg1"/>
+              </a:solidFill>
+              <a:tailEnd type="triangle"/>
+            </a:ln>
+          </p:spPr>
+          <p:style>
+            <a:lnRef idx="2">
+              <a:schemeClr val="accent1"/>
+            </a:lnRef>
+            <a:fillRef idx="0">
+              <a:schemeClr val="accent1"/>
+            </a:fillRef>
+            <a:effectRef idx="1">
+              <a:schemeClr val="accent1"/>
+            </a:effectRef>
+            <a:fontRef idx="minor">
+              <a:schemeClr val="tx1"/>
+            </a:fontRef>
+          </p:style>
+        </p:cxnSp>
+        <p:cxnSp>
+          <p:nvCxnSpPr>
+            <p:cNvPr id="24" name="Straight Arrow Connector 23">
+              <a:extLst>
+                <a:ext uri="{FF2B5EF4-FFF2-40B4-BE49-F238E27FC236}">
+                  <a16:creationId xmlns:a16="http://schemas.microsoft.com/office/drawing/2014/main" id="{05FDF6E9-4B09-09AC-9DB9-42A9930DA940}"/>
+                </a:ext>
+              </a:extLst>
+            </p:cNvPr>
+            <p:cNvCxnSpPr>
+              <a:cxnSpLocks/>
+            </p:cNvCxnSpPr>
+            <p:nvPr/>
+          </p:nvCxnSpPr>
+          <p:spPr>
+            <a:xfrm>
+              <a:off x="5431034" y="3468063"/>
+              <a:ext cx="0" cy="496834"/>
+            </a:xfrm>
+            <a:prstGeom prst="straightConnector1">
+              <a:avLst/>
+            </a:prstGeom>
+            <a:ln>
+              <a:solidFill>
+                <a:schemeClr val="bg1"/>
+              </a:solidFill>
+              <a:tailEnd type="triangle"/>
+            </a:ln>
+          </p:spPr>
+          <p:style>
+            <a:lnRef idx="2">
+              <a:schemeClr val="accent1"/>
+            </a:lnRef>
+            <a:fillRef idx="0">
+              <a:schemeClr val="accent1"/>
+            </a:fillRef>
+            <a:effectRef idx="1">
+              <a:schemeClr val="accent1"/>
+            </a:effectRef>
+            <a:fontRef idx="minor">
+              <a:schemeClr val="tx1"/>
+            </a:fontRef>
+          </p:style>
+        </p:cxnSp>
+        <p:cxnSp>
+          <p:nvCxnSpPr>
+            <p:cNvPr id="25" name="Straight Arrow Connector 24">
+              <a:extLst>
+                <a:ext uri="{FF2B5EF4-FFF2-40B4-BE49-F238E27FC236}">
+                  <a16:creationId xmlns:a16="http://schemas.microsoft.com/office/drawing/2014/main" id="{41CFD3DD-6B15-7D1E-3F2D-EC2AB1D439A5}"/>
+                </a:ext>
+              </a:extLst>
+            </p:cNvPr>
+            <p:cNvCxnSpPr>
+              <a:cxnSpLocks/>
+            </p:cNvCxnSpPr>
+            <p:nvPr/>
+          </p:nvCxnSpPr>
+          <p:spPr>
+            <a:xfrm>
+              <a:off x="5136630" y="3468063"/>
+              <a:ext cx="0" cy="496834"/>
+            </a:xfrm>
+            <a:prstGeom prst="straightConnector1">
+              <a:avLst/>
+            </a:prstGeom>
+            <a:ln>
+              <a:solidFill>
+                <a:schemeClr val="bg1"/>
+              </a:solidFill>
+              <a:tailEnd type="triangle"/>
+            </a:ln>
+          </p:spPr>
+          <p:style>
+            <a:lnRef idx="2">
+              <a:schemeClr val="accent1"/>
+            </a:lnRef>
+            <a:fillRef idx="0">
+              <a:schemeClr val="accent1"/>
+            </a:fillRef>
+            <a:effectRef idx="1">
+              <a:schemeClr val="accent1"/>
+            </a:effectRef>
+            <a:fontRef idx="minor">
+              <a:schemeClr val="tx1"/>
+            </a:fontRef>
+          </p:style>
+        </p:cxnSp>
+      </p:grpSp>
+    </p:spTree>
+    <p:extLst>
+      <p:ext uri="{BB962C8B-B14F-4D97-AF65-F5344CB8AC3E}">
+        <p14:creationId xmlns:p14="http://schemas.microsoft.com/office/powerpoint/2010/main" val="2708621152"/>
       </p:ext>
     </p:extLst>
   </p:cSld>

</xml_diff>